<commit_message>
added a slide to explain algo
</commit_message>
<xml_diff>
--- a/presentation.pptx
+++ b/presentation.pptx
@@ -10,13 +10,14 @@
     <p:sldId id="258" r:id="rId4"/>
     <p:sldId id="259" r:id="rId5"/>
     <p:sldId id="260" r:id="rId6"/>
-    <p:sldId id="261" r:id="rId7"/>
-    <p:sldId id="262" r:id="rId8"/>
-    <p:sldId id="265" r:id="rId9"/>
-    <p:sldId id="266" r:id="rId10"/>
-    <p:sldId id="263" r:id="rId11"/>
-    <p:sldId id="267" r:id="rId12"/>
-    <p:sldId id="264" r:id="rId13"/>
+    <p:sldId id="268" r:id="rId7"/>
+    <p:sldId id="261" r:id="rId8"/>
+    <p:sldId id="262" r:id="rId9"/>
+    <p:sldId id="265" r:id="rId10"/>
+    <p:sldId id="266" r:id="rId11"/>
+    <p:sldId id="263" r:id="rId12"/>
+    <p:sldId id="267" r:id="rId13"/>
+    <p:sldId id="264" r:id="rId14"/>
   </p:sldIdLst>
   <p:sldSz cx="12192000" cy="6858000"/>
   <p:notesSz cx="6858000" cy="9144000"/>
@@ -4011,24 +4012,8 @@
           <a:lstStyle/>
           <a:p>
             <a:r>
-              <a:rPr lang="de-CH" dirty="0" err="1" smtClean="0"/>
-              <a:t>Improving</a:t>
-            </a:r>
-            <a:r>
-              <a:rPr lang="de-CH" dirty="0" smtClean="0"/>
-              <a:t> </a:t>
-            </a:r>
-            <a:r>
-              <a:rPr lang="de-CH" dirty="0" err="1" smtClean="0"/>
-              <a:t>the</a:t>
-            </a:r>
-            <a:r>
-              <a:rPr lang="de-CH" dirty="0" smtClean="0"/>
-              <a:t> </a:t>
-            </a:r>
-            <a:r>
-              <a:rPr lang="de-CH" dirty="0" err="1" smtClean="0"/>
-              <a:t>Algorithm</a:t>
+              <a:rPr lang="de-CH" dirty="0" smtClean="0"/>
+              <a:t>Demo</a:t>
             </a:r>
             <a:endParaRPr lang="de-CH" dirty="0"/>
           </a:p>
@@ -4046,567 +4031,17 @@
         </p:nvSpPr>
         <p:spPr/>
         <p:txBody>
-          <a:bodyPr>
-            <a:normAutofit fontScale="92500" lnSpcReduction="20000"/>
-          </a:bodyPr>
+          <a:bodyPr/>
           <a:lstStyle/>
           <a:p>
-            <a:r>
-              <a:rPr lang="de-CH" dirty="0"/>
-              <a:t>Goal: </a:t>
-            </a:r>
-            <a:r>
-              <a:rPr lang="de-CH" dirty="0" err="1" smtClean="0"/>
-              <a:t>better</a:t>
-            </a:r>
-            <a:r>
-              <a:rPr lang="de-CH" dirty="0" smtClean="0"/>
-              <a:t> </a:t>
-            </a:r>
-            <a:r>
-              <a:rPr lang="de-CH" dirty="0" err="1" smtClean="0"/>
-              <a:t>compression</a:t>
-            </a:r>
-            <a:endParaRPr lang="de-CH" dirty="0" smtClean="0"/>
-          </a:p>
-          <a:p>
-            <a:r>
-              <a:rPr lang="de-CH" dirty="0" smtClean="0">
-                <a:sym typeface="Wingdings" panose="05000000000000000000" pitchFamily="2" charset="2"/>
-              </a:rPr>
-              <a:t> </a:t>
-            </a:r>
-            <a:r>
-              <a:rPr lang="de-CH" dirty="0" err="1" smtClean="0"/>
-              <a:t>Make</a:t>
-            </a:r>
-            <a:r>
-              <a:rPr lang="de-CH" dirty="0" smtClean="0"/>
-              <a:t> </a:t>
-            </a:r>
-            <a:r>
-              <a:rPr lang="de-CH" dirty="0" err="1" smtClean="0"/>
-              <a:t>it</a:t>
-            </a:r>
-            <a:r>
-              <a:rPr lang="de-CH" dirty="0" smtClean="0"/>
-              <a:t> </a:t>
-            </a:r>
-            <a:r>
-              <a:rPr lang="de-CH" dirty="0" err="1" smtClean="0"/>
-              <a:t>lossy</a:t>
-            </a:r>
-            <a:r>
-              <a:rPr lang="de-CH" dirty="0" smtClean="0"/>
-              <a:t> (Trade-off: </a:t>
-            </a:r>
-            <a:r>
-              <a:rPr lang="de-CH" dirty="0" err="1" smtClean="0"/>
-              <a:t>sacrifice</a:t>
-            </a:r>
-            <a:r>
-              <a:rPr lang="de-CH" dirty="0" smtClean="0"/>
-              <a:t> </a:t>
-            </a:r>
-            <a:r>
-              <a:rPr lang="de-CH" dirty="0" err="1" smtClean="0"/>
-              <a:t>image</a:t>
-            </a:r>
-            <a:r>
-              <a:rPr lang="de-CH" dirty="0" smtClean="0"/>
-              <a:t> </a:t>
-            </a:r>
-            <a:r>
-              <a:rPr lang="de-CH" dirty="0" err="1" smtClean="0"/>
-              <a:t>quality</a:t>
-            </a:r>
-            <a:r>
-              <a:rPr lang="de-CH" dirty="0" smtClean="0"/>
-              <a:t> </a:t>
-            </a:r>
-            <a:r>
-              <a:rPr lang="de-CH" dirty="0" err="1" smtClean="0"/>
-              <a:t>to</a:t>
-            </a:r>
-            <a:r>
-              <a:rPr lang="de-CH" dirty="0" smtClean="0"/>
-              <a:t> find </a:t>
-            </a:r>
-            <a:r>
-              <a:rPr lang="de-CH" dirty="0" err="1" smtClean="0"/>
-              <a:t>more</a:t>
-            </a:r>
-            <a:r>
-              <a:rPr lang="de-CH" dirty="0" smtClean="0"/>
-              <a:t> </a:t>
-            </a:r>
-            <a:r>
-              <a:rPr lang="de-CH" dirty="0" err="1" smtClean="0"/>
-              <a:t>patterns</a:t>
-            </a:r>
-            <a:r>
-              <a:rPr lang="de-CH" dirty="0" smtClean="0"/>
-              <a:t>)</a:t>
-            </a:r>
-          </a:p>
-          <a:p>
-            <a:r>
-              <a:rPr lang="de-CH" dirty="0" err="1" smtClean="0"/>
-              <a:t>Idea</a:t>
-            </a:r>
-            <a:r>
-              <a:rPr lang="de-CH" dirty="0" smtClean="0"/>
-              <a:t>: Smooth </a:t>
-            </a:r>
-            <a:r>
-              <a:rPr lang="de-CH" dirty="0" err="1" smtClean="0"/>
-              <a:t>image</a:t>
-            </a:r>
-            <a:r>
-              <a:rPr lang="de-CH" dirty="0" smtClean="0"/>
-              <a:t> </a:t>
-            </a:r>
-            <a:r>
-              <a:rPr lang="de-CH" dirty="0" err="1" smtClean="0"/>
-              <a:t>before</a:t>
-            </a:r>
-            <a:r>
-              <a:rPr lang="de-CH" dirty="0" smtClean="0"/>
-              <a:t> </a:t>
-            </a:r>
-            <a:r>
-              <a:rPr lang="de-CH" dirty="0" err="1" smtClean="0"/>
-              <a:t>compressing</a:t>
-            </a:r>
-            <a:r>
-              <a:rPr lang="de-CH" dirty="0" smtClean="0"/>
-              <a:t> </a:t>
-            </a:r>
-            <a:r>
-              <a:rPr lang="de-CH" dirty="0" err="1" smtClean="0"/>
-              <a:t>to</a:t>
-            </a:r>
-            <a:r>
-              <a:rPr lang="de-CH" dirty="0" smtClean="0"/>
-              <a:t> </a:t>
-            </a:r>
-            <a:r>
-              <a:rPr lang="de-CH" dirty="0" err="1" smtClean="0"/>
-              <a:t>reduce</a:t>
-            </a:r>
-            <a:r>
-              <a:rPr lang="de-CH" dirty="0" smtClean="0"/>
-              <a:t> </a:t>
-            </a:r>
-            <a:r>
-              <a:rPr lang="de-CH" dirty="0" err="1" smtClean="0"/>
-              <a:t>noise</a:t>
-            </a:r>
-            <a:endParaRPr lang="de-CH" dirty="0"/>
-          </a:p>
-          <a:p>
-            <a:pPr lvl="1"/>
-            <a:r>
-              <a:rPr lang="de-CH" dirty="0" smtClean="0">
-                <a:sym typeface="Wingdings" panose="05000000000000000000" pitchFamily="2" charset="2"/>
-              </a:rPr>
-              <a:t> </a:t>
-            </a:r>
-            <a:r>
-              <a:rPr lang="de-CH" dirty="0" err="1" smtClean="0">
-                <a:sym typeface="Wingdings" panose="05000000000000000000" pitchFamily="2" charset="2"/>
-              </a:rPr>
-              <a:t>Did</a:t>
-            </a:r>
-            <a:r>
-              <a:rPr lang="de-CH" dirty="0" smtClean="0">
-                <a:sym typeface="Wingdings" panose="05000000000000000000" pitchFamily="2" charset="2"/>
-              </a:rPr>
-              <a:t> not </a:t>
-            </a:r>
-            <a:r>
-              <a:rPr lang="de-CH" dirty="0" err="1" smtClean="0">
-                <a:sym typeface="Wingdings" panose="05000000000000000000" pitchFamily="2" charset="2"/>
-              </a:rPr>
-              <a:t>work</a:t>
-            </a:r>
-            <a:r>
-              <a:rPr lang="de-CH" dirty="0" smtClean="0">
-                <a:sym typeface="Wingdings" panose="05000000000000000000" pitchFamily="2" charset="2"/>
-              </a:rPr>
-              <a:t>, </a:t>
-            </a:r>
-            <a:r>
-              <a:rPr lang="de-CH" dirty="0" err="1" smtClean="0">
-                <a:sym typeface="Wingdings" panose="05000000000000000000" pitchFamily="2" charset="2"/>
-              </a:rPr>
-              <a:t>because</a:t>
-            </a:r>
-            <a:r>
-              <a:rPr lang="de-CH" dirty="0">
-                <a:sym typeface="Wingdings" panose="05000000000000000000" pitchFamily="2" charset="2"/>
-              </a:rPr>
-              <a:t> </a:t>
-            </a:r>
-            <a:r>
-              <a:rPr lang="de-CH" dirty="0" err="1" smtClean="0">
-                <a:sym typeface="Wingdings" panose="05000000000000000000" pitchFamily="2" charset="2"/>
-              </a:rPr>
-              <a:t>gradients</a:t>
-            </a:r>
-            <a:r>
-              <a:rPr lang="de-CH" dirty="0" smtClean="0">
-                <a:sym typeface="Wingdings" panose="05000000000000000000" pitchFamily="2" charset="2"/>
-              </a:rPr>
-              <a:t> </a:t>
-            </a:r>
-            <a:r>
-              <a:rPr lang="de-CH" dirty="0" err="1" smtClean="0">
-                <a:sym typeface="Wingdings" panose="05000000000000000000" pitchFamily="2" charset="2"/>
-              </a:rPr>
-              <a:t>alongside</a:t>
-            </a:r>
-            <a:r>
-              <a:rPr lang="de-CH" dirty="0" smtClean="0">
-                <a:sym typeface="Wingdings" panose="05000000000000000000" pitchFamily="2" charset="2"/>
-              </a:rPr>
-              <a:t> </a:t>
-            </a:r>
-            <a:r>
-              <a:rPr lang="de-CH" dirty="0" err="1" smtClean="0">
-                <a:sym typeface="Wingdings" panose="05000000000000000000" pitchFamily="2" charset="2"/>
-              </a:rPr>
-              <a:t>edges</a:t>
-            </a:r>
-            <a:endParaRPr lang="de-CH" dirty="0" smtClean="0">
-              <a:sym typeface="Wingdings" panose="05000000000000000000" pitchFamily="2" charset="2"/>
-            </a:endParaRPr>
-          </a:p>
-          <a:p>
-            <a:r>
-              <a:rPr lang="de-CH" dirty="0" smtClean="0">
-                <a:sym typeface="Wingdings" panose="05000000000000000000" pitchFamily="2" charset="2"/>
-              </a:rPr>
-              <a:t>So: Do </a:t>
-            </a:r>
-            <a:r>
-              <a:rPr lang="de-CH" dirty="0" err="1" smtClean="0">
-                <a:sym typeface="Wingdings" panose="05000000000000000000" pitchFamily="2" charset="2"/>
-              </a:rPr>
-              <a:t>the</a:t>
-            </a:r>
-            <a:r>
-              <a:rPr lang="de-CH" dirty="0" smtClean="0">
-                <a:sym typeface="Wingdings" panose="05000000000000000000" pitchFamily="2" charset="2"/>
-              </a:rPr>
-              <a:t> </a:t>
-            </a:r>
-            <a:r>
-              <a:rPr lang="de-CH" dirty="0" err="1" smtClean="0">
-                <a:sym typeface="Wingdings" panose="05000000000000000000" pitchFamily="2" charset="2"/>
-              </a:rPr>
-              <a:t>opposite</a:t>
-            </a:r>
-            <a:r>
-              <a:rPr lang="de-CH" dirty="0" smtClean="0">
-                <a:sym typeface="Wingdings" panose="05000000000000000000" pitchFamily="2" charset="2"/>
-              </a:rPr>
-              <a:t>, </a:t>
-            </a:r>
-            <a:r>
-              <a:rPr lang="de-CH" dirty="0" err="1" smtClean="0">
-                <a:sym typeface="Wingdings" panose="05000000000000000000" pitchFamily="2" charset="2"/>
-              </a:rPr>
-              <a:t>sharpen</a:t>
-            </a:r>
-            <a:r>
-              <a:rPr lang="de-CH" dirty="0" smtClean="0">
-                <a:sym typeface="Wingdings" panose="05000000000000000000" pitchFamily="2" charset="2"/>
-              </a:rPr>
-              <a:t> </a:t>
-            </a:r>
-            <a:r>
-              <a:rPr lang="de-CH" dirty="0" err="1" smtClean="0">
-                <a:sym typeface="Wingdings" panose="05000000000000000000" pitchFamily="2" charset="2"/>
-              </a:rPr>
-              <a:t>the</a:t>
-            </a:r>
-            <a:r>
-              <a:rPr lang="de-CH" dirty="0" smtClean="0">
-                <a:sym typeface="Wingdings" panose="05000000000000000000" pitchFamily="2" charset="2"/>
-              </a:rPr>
-              <a:t> </a:t>
-            </a:r>
-            <a:r>
-              <a:rPr lang="de-CH" dirty="0" err="1" smtClean="0">
-                <a:sym typeface="Wingdings" panose="05000000000000000000" pitchFamily="2" charset="2"/>
-              </a:rPr>
-              <a:t>image</a:t>
-            </a:r>
-            <a:r>
-              <a:rPr lang="de-CH" dirty="0" smtClean="0">
-                <a:sym typeface="Wingdings" panose="05000000000000000000" pitchFamily="2" charset="2"/>
-              </a:rPr>
-              <a:t>:</a:t>
-            </a:r>
-          </a:p>
-          <a:p>
-            <a:pPr lvl="1"/>
-            <a:r>
-              <a:rPr lang="de-CH" dirty="0" smtClean="0">
-                <a:sym typeface="Wingdings" panose="05000000000000000000" pitchFamily="2" charset="2"/>
-              </a:rPr>
-              <a:t> </a:t>
-            </a:r>
-            <a:r>
-              <a:rPr lang="de-CH" dirty="0" err="1" smtClean="0">
-                <a:sym typeface="Wingdings" panose="05000000000000000000" pitchFamily="2" charset="2"/>
-              </a:rPr>
-              <a:t>Only</a:t>
-            </a:r>
-            <a:r>
-              <a:rPr lang="de-CH" dirty="0" smtClean="0">
-                <a:sym typeface="Wingdings" panose="05000000000000000000" pitchFamily="2" charset="2"/>
-              </a:rPr>
-              <a:t> </a:t>
-            </a:r>
-            <a:r>
-              <a:rPr lang="de-CH" dirty="0" err="1" smtClean="0">
-                <a:sym typeface="Wingdings" panose="05000000000000000000" pitchFamily="2" charset="2"/>
-              </a:rPr>
-              <a:t>worked</a:t>
-            </a:r>
-            <a:r>
-              <a:rPr lang="de-CH" dirty="0" smtClean="0">
-                <a:sym typeface="Wingdings" panose="05000000000000000000" pitchFamily="2" charset="2"/>
-              </a:rPr>
-              <a:t> </a:t>
-            </a:r>
-            <a:r>
-              <a:rPr lang="de-CH" dirty="0" err="1" smtClean="0">
-                <a:sym typeface="Wingdings" panose="05000000000000000000" pitchFamily="2" charset="2"/>
-              </a:rPr>
-              <a:t>for</a:t>
-            </a:r>
-            <a:r>
-              <a:rPr lang="de-CH" dirty="0" smtClean="0">
-                <a:sym typeface="Wingdings" panose="05000000000000000000" pitchFamily="2" charset="2"/>
-              </a:rPr>
-              <a:t> </a:t>
-            </a:r>
-            <a:r>
-              <a:rPr lang="de-CH" dirty="0" err="1" smtClean="0">
-                <a:sym typeface="Wingdings" panose="05000000000000000000" pitchFamily="2" charset="2"/>
-              </a:rPr>
-              <a:t>certain</a:t>
-            </a:r>
-            <a:r>
-              <a:rPr lang="de-CH" dirty="0" smtClean="0">
-                <a:sym typeface="Wingdings" panose="05000000000000000000" pitchFamily="2" charset="2"/>
-              </a:rPr>
-              <a:t> </a:t>
-            </a:r>
-            <a:r>
-              <a:rPr lang="de-CH" dirty="0" err="1" smtClean="0">
-                <a:sym typeface="Wingdings" panose="05000000000000000000" pitchFamily="2" charset="2"/>
-              </a:rPr>
-              <a:t>images</a:t>
-            </a:r>
-            <a:r>
-              <a:rPr lang="de-CH" dirty="0" smtClean="0">
-                <a:sym typeface="Wingdings" panose="05000000000000000000" pitchFamily="2" charset="2"/>
-              </a:rPr>
-              <a:t> (not </a:t>
-            </a:r>
-            <a:r>
-              <a:rPr lang="de-CH" dirty="0" err="1" smtClean="0">
-                <a:sym typeface="Wingdings" panose="05000000000000000000" pitchFamily="2" charset="2"/>
-              </a:rPr>
-              <a:t>for</a:t>
-            </a:r>
-            <a:r>
-              <a:rPr lang="de-CH" dirty="0" smtClean="0">
-                <a:sym typeface="Wingdings" panose="05000000000000000000" pitchFamily="2" charset="2"/>
-              </a:rPr>
-              <a:t> simple </a:t>
-            </a:r>
-            <a:r>
-              <a:rPr lang="de-CH" dirty="0" err="1" smtClean="0">
-                <a:sym typeface="Wingdings" panose="05000000000000000000" pitchFamily="2" charset="2"/>
-              </a:rPr>
-              <a:t>images</a:t>
-            </a:r>
-            <a:r>
-              <a:rPr lang="de-CH" dirty="0" smtClean="0">
-                <a:sym typeface="Wingdings" panose="05000000000000000000" pitchFamily="2" charset="2"/>
-              </a:rPr>
-              <a:t> </a:t>
-            </a:r>
-            <a:r>
-              <a:rPr lang="de-CH" dirty="0" err="1" smtClean="0">
-                <a:sym typeface="Wingdings" panose="05000000000000000000" pitchFamily="2" charset="2"/>
-              </a:rPr>
-              <a:t>like</a:t>
-            </a:r>
-            <a:r>
-              <a:rPr lang="de-CH" dirty="0" smtClean="0">
-                <a:sym typeface="Wingdings" panose="05000000000000000000" pitchFamily="2" charset="2"/>
-              </a:rPr>
-              <a:t> </a:t>
-            </a:r>
-            <a:r>
-              <a:rPr lang="de-CH" dirty="0" err="1" smtClean="0">
-                <a:sym typeface="Wingdings" panose="05000000000000000000" pitchFamily="2" charset="2"/>
-              </a:rPr>
-              <a:t>perfect</a:t>
-            </a:r>
-            <a:r>
-              <a:rPr lang="de-CH" dirty="0" smtClean="0">
-                <a:sym typeface="Wingdings" panose="05000000000000000000" pitchFamily="2" charset="2"/>
-              </a:rPr>
-              <a:t> </a:t>
-            </a:r>
-            <a:r>
-              <a:rPr lang="de-CH" dirty="0" err="1" smtClean="0">
-                <a:sym typeface="Wingdings" panose="05000000000000000000" pitchFamily="2" charset="2"/>
-              </a:rPr>
-              <a:t>checkerboard</a:t>
-            </a:r>
-            <a:r>
-              <a:rPr lang="de-CH" dirty="0" smtClean="0">
-                <a:sym typeface="Wingdings" panose="05000000000000000000" pitchFamily="2" charset="2"/>
-              </a:rPr>
-              <a:t>)</a:t>
-            </a:r>
-          </a:p>
-          <a:p>
-            <a:r>
-              <a:rPr lang="de-CH" dirty="0" smtClean="0">
-                <a:sym typeface="Wingdings" panose="05000000000000000000" pitchFamily="2" charset="2"/>
-              </a:rPr>
-              <a:t>Best (</a:t>
-            </a:r>
-            <a:r>
-              <a:rPr lang="de-CH" dirty="0" err="1" smtClean="0">
-                <a:sym typeface="Wingdings" panose="05000000000000000000" pitchFamily="2" charset="2"/>
-              </a:rPr>
-              <a:t>and</a:t>
-            </a:r>
-            <a:r>
-              <a:rPr lang="de-CH" dirty="0" smtClean="0">
-                <a:sym typeface="Wingdings" panose="05000000000000000000" pitchFamily="2" charset="2"/>
-              </a:rPr>
-              <a:t> </a:t>
-            </a:r>
-            <a:r>
-              <a:rPr lang="de-CH" dirty="0" err="1" smtClean="0">
-                <a:sym typeface="Wingdings" panose="05000000000000000000" pitchFamily="2" charset="2"/>
-              </a:rPr>
-              <a:t>easiest</a:t>
-            </a:r>
-            <a:r>
-              <a:rPr lang="de-CH" dirty="0" smtClean="0">
-                <a:sym typeface="Wingdings" panose="05000000000000000000" pitchFamily="2" charset="2"/>
-              </a:rPr>
-              <a:t>) </a:t>
-            </a:r>
-            <a:r>
-              <a:rPr lang="de-CH" dirty="0" err="1" smtClean="0">
-                <a:sym typeface="Wingdings" panose="05000000000000000000" pitchFamily="2" charset="2"/>
-              </a:rPr>
-              <a:t>solution</a:t>
-            </a:r>
-            <a:r>
-              <a:rPr lang="de-CH" dirty="0" smtClean="0">
-                <a:sym typeface="Wingdings" panose="05000000000000000000" pitchFamily="2" charset="2"/>
-              </a:rPr>
-              <a:t>: </a:t>
-            </a:r>
-            <a:r>
-              <a:rPr lang="de-CH" dirty="0" err="1" smtClean="0">
-                <a:sym typeface="Wingdings" panose="05000000000000000000" pitchFamily="2" charset="2"/>
-              </a:rPr>
-              <a:t>reduce</a:t>
-            </a:r>
-            <a:r>
-              <a:rPr lang="de-CH" dirty="0" smtClean="0">
-                <a:sym typeface="Wingdings" panose="05000000000000000000" pitchFamily="2" charset="2"/>
-              </a:rPr>
-              <a:t> </a:t>
-            </a:r>
-            <a:r>
-              <a:rPr lang="de-CH" dirty="0" err="1" smtClean="0">
-                <a:sym typeface="Wingdings" panose="05000000000000000000" pitchFamily="2" charset="2"/>
-              </a:rPr>
-              <a:t>the</a:t>
-            </a:r>
-            <a:r>
-              <a:rPr lang="de-CH" dirty="0" smtClean="0">
-                <a:sym typeface="Wingdings" panose="05000000000000000000" pitchFamily="2" charset="2"/>
-              </a:rPr>
-              <a:t> </a:t>
-            </a:r>
-            <a:r>
-              <a:rPr lang="de-CH" dirty="0" err="1" smtClean="0">
-                <a:sym typeface="Wingdings" panose="05000000000000000000" pitchFamily="2" charset="2"/>
-              </a:rPr>
-              <a:t>colors</a:t>
-            </a:r>
-            <a:r>
-              <a:rPr lang="de-CH" dirty="0" smtClean="0">
-                <a:sym typeface="Wingdings" panose="05000000000000000000" pitchFamily="2" charset="2"/>
-              </a:rPr>
-              <a:t> </a:t>
-            </a:r>
-            <a:r>
-              <a:rPr lang="de-CH" dirty="0" err="1" smtClean="0">
-                <a:sym typeface="Wingdings" panose="05000000000000000000" pitchFamily="2" charset="2"/>
-              </a:rPr>
-              <a:t>of</a:t>
-            </a:r>
-            <a:r>
-              <a:rPr lang="de-CH" dirty="0" smtClean="0">
-                <a:sym typeface="Wingdings" panose="05000000000000000000" pitchFamily="2" charset="2"/>
-              </a:rPr>
-              <a:t> </a:t>
-            </a:r>
-            <a:r>
-              <a:rPr lang="de-CH" dirty="0" err="1" smtClean="0">
-                <a:sym typeface="Wingdings" panose="05000000000000000000" pitchFamily="2" charset="2"/>
-              </a:rPr>
-              <a:t>the</a:t>
-            </a:r>
-            <a:r>
-              <a:rPr lang="de-CH" dirty="0" smtClean="0">
-                <a:sym typeface="Wingdings" panose="05000000000000000000" pitchFamily="2" charset="2"/>
-              </a:rPr>
-              <a:t> </a:t>
-            </a:r>
-            <a:r>
-              <a:rPr lang="de-CH" dirty="0" err="1" smtClean="0">
-                <a:sym typeface="Wingdings" panose="05000000000000000000" pitchFamily="2" charset="2"/>
-              </a:rPr>
-              <a:t>image</a:t>
-            </a:r>
-            <a:endParaRPr lang="de-CH" dirty="0" smtClean="0"/>
-          </a:p>
-          <a:p>
-            <a:pPr lvl="1"/>
-            <a:endParaRPr lang="de-CH" dirty="0" smtClean="0"/>
-          </a:p>
-          <a:p>
-            <a:pPr lvl="1"/>
-            <a:endParaRPr lang="de-CH" dirty="0" smtClean="0"/>
-          </a:p>
-          <a:p>
-            <a:endParaRPr lang="de-CH" dirty="0"/>
+            <a:endParaRPr lang="de-CH"/>
           </a:p>
         </p:txBody>
       </p:sp>
     </p:spTree>
     <p:extLst>
       <p:ext uri="{BB962C8B-B14F-4D97-AF65-F5344CB8AC3E}">
-        <p14:creationId xmlns:p14="http://schemas.microsoft.com/office/powerpoint/2010/main" val="1975917876"/>
+        <p14:creationId xmlns:p14="http://schemas.microsoft.com/office/powerpoint/2010/main" val="1860183357"/>
       </p:ext>
     </p:extLst>
   </p:cSld>
@@ -4657,19 +4092,23 @@
           <a:p>
             <a:r>
               <a:rPr lang="de-CH" dirty="0" err="1" smtClean="0"/>
-              <a:t>Conlusion</a:t>
-            </a:r>
-            <a:r>
-              <a:rPr lang="de-CH" dirty="0" smtClean="0"/>
-              <a:t> (TODO </a:t>
-            </a:r>
-            <a:r>
-              <a:rPr lang="de-CH" dirty="0" err="1" smtClean="0"/>
-              <a:t>maybe</a:t>
-            </a:r>
-            <a:r>
-              <a:rPr lang="de-CH" dirty="0" smtClean="0"/>
-              <a:t>?)</a:t>
+              <a:t>Improving</a:t>
+            </a:r>
+            <a:r>
+              <a:rPr lang="de-CH" dirty="0" smtClean="0"/>
+              <a:t> </a:t>
+            </a:r>
+            <a:r>
+              <a:rPr lang="de-CH" dirty="0" err="1" smtClean="0"/>
+              <a:t>the</a:t>
+            </a:r>
+            <a:r>
+              <a:rPr lang="de-CH" dirty="0" smtClean="0"/>
+              <a:t> </a:t>
+            </a:r>
+            <a:r>
+              <a:rPr lang="de-CH" dirty="0" err="1" smtClean="0"/>
+              <a:t>Algorithm</a:t>
             </a:r>
             <a:endParaRPr lang="de-CH" dirty="0"/>
           </a:p>
@@ -4683,6 +4122,612 @@
           </p:cNvSpPr>
           <p:nvPr>
             <p:ph idx="1"/>
+          </p:nvPr>
+        </p:nvSpPr>
+        <p:spPr/>
+        <p:txBody>
+          <a:bodyPr>
+            <a:normAutofit fontScale="92500" lnSpcReduction="20000"/>
+          </a:bodyPr>
+          <a:lstStyle/>
+          <a:p>
+            <a:r>
+              <a:rPr lang="de-CH" dirty="0"/>
+              <a:t>Goal: </a:t>
+            </a:r>
+            <a:r>
+              <a:rPr lang="de-CH" dirty="0" err="1" smtClean="0"/>
+              <a:t>better</a:t>
+            </a:r>
+            <a:r>
+              <a:rPr lang="de-CH" dirty="0" smtClean="0"/>
+              <a:t> </a:t>
+            </a:r>
+            <a:r>
+              <a:rPr lang="de-CH" dirty="0" err="1" smtClean="0"/>
+              <a:t>compression</a:t>
+            </a:r>
+            <a:endParaRPr lang="de-CH" dirty="0" smtClean="0"/>
+          </a:p>
+          <a:p>
+            <a:r>
+              <a:rPr lang="de-CH" dirty="0" smtClean="0">
+                <a:sym typeface="Wingdings" panose="05000000000000000000" pitchFamily="2" charset="2"/>
+              </a:rPr>
+              <a:t> </a:t>
+            </a:r>
+            <a:r>
+              <a:rPr lang="de-CH" dirty="0" err="1" smtClean="0"/>
+              <a:t>Make</a:t>
+            </a:r>
+            <a:r>
+              <a:rPr lang="de-CH" dirty="0" smtClean="0"/>
+              <a:t> </a:t>
+            </a:r>
+            <a:r>
+              <a:rPr lang="de-CH" dirty="0" err="1" smtClean="0"/>
+              <a:t>it</a:t>
+            </a:r>
+            <a:r>
+              <a:rPr lang="de-CH" dirty="0" smtClean="0"/>
+              <a:t> </a:t>
+            </a:r>
+            <a:r>
+              <a:rPr lang="de-CH" dirty="0" err="1" smtClean="0"/>
+              <a:t>lossy</a:t>
+            </a:r>
+            <a:r>
+              <a:rPr lang="de-CH" dirty="0" smtClean="0"/>
+              <a:t> (Trade-off: </a:t>
+            </a:r>
+            <a:r>
+              <a:rPr lang="de-CH" dirty="0" err="1" smtClean="0"/>
+              <a:t>sacrifice</a:t>
+            </a:r>
+            <a:r>
+              <a:rPr lang="de-CH" dirty="0" smtClean="0"/>
+              <a:t> </a:t>
+            </a:r>
+            <a:r>
+              <a:rPr lang="de-CH" dirty="0" err="1" smtClean="0"/>
+              <a:t>image</a:t>
+            </a:r>
+            <a:r>
+              <a:rPr lang="de-CH" dirty="0" smtClean="0"/>
+              <a:t> </a:t>
+            </a:r>
+            <a:r>
+              <a:rPr lang="de-CH" dirty="0" err="1" smtClean="0"/>
+              <a:t>quality</a:t>
+            </a:r>
+            <a:r>
+              <a:rPr lang="de-CH" dirty="0" smtClean="0"/>
+              <a:t> </a:t>
+            </a:r>
+            <a:r>
+              <a:rPr lang="de-CH" dirty="0" err="1" smtClean="0"/>
+              <a:t>to</a:t>
+            </a:r>
+            <a:r>
+              <a:rPr lang="de-CH" dirty="0" smtClean="0"/>
+              <a:t> find </a:t>
+            </a:r>
+            <a:r>
+              <a:rPr lang="de-CH" dirty="0" err="1" smtClean="0"/>
+              <a:t>more</a:t>
+            </a:r>
+            <a:r>
+              <a:rPr lang="de-CH" dirty="0" smtClean="0"/>
+              <a:t> </a:t>
+            </a:r>
+            <a:r>
+              <a:rPr lang="de-CH" dirty="0" err="1" smtClean="0"/>
+              <a:t>patterns</a:t>
+            </a:r>
+            <a:r>
+              <a:rPr lang="de-CH" dirty="0" smtClean="0"/>
+              <a:t>)</a:t>
+            </a:r>
+          </a:p>
+          <a:p>
+            <a:r>
+              <a:rPr lang="de-CH" dirty="0" err="1" smtClean="0"/>
+              <a:t>Idea</a:t>
+            </a:r>
+            <a:r>
+              <a:rPr lang="de-CH" dirty="0" smtClean="0"/>
+              <a:t>: Smooth </a:t>
+            </a:r>
+            <a:r>
+              <a:rPr lang="de-CH" dirty="0" err="1" smtClean="0"/>
+              <a:t>image</a:t>
+            </a:r>
+            <a:r>
+              <a:rPr lang="de-CH" dirty="0" smtClean="0"/>
+              <a:t> </a:t>
+            </a:r>
+            <a:r>
+              <a:rPr lang="de-CH" dirty="0" err="1" smtClean="0"/>
+              <a:t>before</a:t>
+            </a:r>
+            <a:r>
+              <a:rPr lang="de-CH" dirty="0" smtClean="0"/>
+              <a:t> </a:t>
+            </a:r>
+            <a:r>
+              <a:rPr lang="de-CH" dirty="0" err="1" smtClean="0"/>
+              <a:t>compressing</a:t>
+            </a:r>
+            <a:r>
+              <a:rPr lang="de-CH" dirty="0" smtClean="0"/>
+              <a:t> </a:t>
+            </a:r>
+            <a:r>
+              <a:rPr lang="de-CH" dirty="0" err="1" smtClean="0"/>
+              <a:t>to</a:t>
+            </a:r>
+            <a:r>
+              <a:rPr lang="de-CH" dirty="0" smtClean="0"/>
+              <a:t> </a:t>
+            </a:r>
+            <a:r>
+              <a:rPr lang="de-CH" dirty="0" err="1" smtClean="0"/>
+              <a:t>reduce</a:t>
+            </a:r>
+            <a:r>
+              <a:rPr lang="de-CH" dirty="0" smtClean="0"/>
+              <a:t> </a:t>
+            </a:r>
+            <a:r>
+              <a:rPr lang="de-CH" dirty="0" err="1" smtClean="0"/>
+              <a:t>noise</a:t>
+            </a:r>
+            <a:endParaRPr lang="de-CH" dirty="0"/>
+          </a:p>
+          <a:p>
+            <a:pPr lvl="1"/>
+            <a:r>
+              <a:rPr lang="de-CH" dirty="0" smtClean="0">
+                <a:sym typeface="Wingdings" panose="05000000000000000000" pitchFamily="2" charset="2"/>
+              </a:rPr>
+              <a:t> </a:t>
+            </a:r>
+            <a:r>
+              <a:rPr lang="de-CH" dirty="0" err="1" smtClean="0">
+                <a:sym typeface="Wingdings" panose="05000000000000000000" pitchFamily="2" charset="2"/>
+              </a:rPr>
+              <a:t>Did</a:t>
+            </a:r>
+            <a:r>
+              <a:rPr lang="de-CH" dirty="0" smtClean="0">
+                <a:sym typeface="Wingdings" panose="05000000000000000000" pitchFamily="2" charset="2"/>
+              </a:rPr>
+              <a:t> not </a:t>
+            </a:r>
+            <a:r>
+              <a:rPr lang="de-CH" dirty="0" err="1" smtClean="0">
+                <a:sym typeface="Wingdings" panose="05000000000000000000" pitchFamily="2" charset="2"/>
+              </a:rPr>
+              <a:t>work</a:t>
+            </a:r>
+            <a:r>
+              <a:rPr lang="de-CH" dirty="0" smtClean="0">
+                <a:sym typeface="Wingdings" panose="05000000000000000000" pitchFamily="2" charset="2"/>
+              </a:rPr>
+              <a:t>, </a:t>
+            </a:r>
+            <a:r>
+              <a:rPr lang="de-CH" dirty="0" err="1" smtClean="0">
+                <a:sym typeface="Wingdings" panose="05000000000000000000" pitchFamily="2" charset="2"/>
+              </a:rPr>
+              <a:t>because</a:t>
+            </a:r>
+            <a:r>
+              <a:rPr lang="de-CH" dirty="0">
+                <a:sym typeface="Wingdings" panose="05000000000000000000" pitchFamily="2" charset="2"/>
+              </a:rPr>
+              <a:t> </a:t>
+            </a:r>
+            <a:r>
+              <a:rPr lang="de-CH" dirty="0" err="1" smtClean="0">
+                <a:sym typeface="Wingdings" panose="05000000000000000000" pitchFamily="2" charset="2"/>
+              </a:rPr>
+              <a:t>gradients</a:t>
+            </a:r>
+            <a:r>
+              <a:rPr lang="de-CH" dirty="0" smtClean="0">
+                <a:sym typeface="Wingdings" panose="05000000000000000000" pitchFamily="2" charset="2"/>
+              </a:rPr>
+              <a:t> </a:t>
+            </a:r>
+            <a:r>
+              <a:rPr lang="de-CH" dirty="0" err="1" smtClean="0">
+                <a:sym typeface="Wingdings" panose="05000000000000000000" pitchFamily="2" charset="2"/>
+              </a:rPr>
+              <a:t>alongside</a:t>
+            </a:r>
+            <a:r>
+              <a:rPr lang="de-CH" dirty="0" smtClean="0">
+                <a:sym typeface="Wingdings" panose="05000000000000000000" pitchFamily="2" charset="2"/>
+              </a:rPr>
+              <a:t> </a:t>
+            </a:r>
+            <a:r>
+              <a:rPr lang="de-CH" dirty="0" err="1" smtClean="0">
+                <a:sym typeface="Wingdings" panose="05000000000000000000" pitchFamily="2" charset="2"/>
+              </a:rPr>
+              <a:t>edges</a:t>
+            </a:r>
+            <a:endParaRPr lang="de-CH" dirty="0" smtClean="0">
+              <a:sym typeface="Wingdings" panose="05000000000000000000" pitchFamily="2" charset="2"/>
+            </a:endParaRPr>
+          </a:p>
+          <a:p>
+            <a:r>
+              <a:rPr lang="de-CH" dirty="0" smtClean="0">
+                <a:sym typeface="Wingdings" panose="05000000000000000000" pitchFamily="2" charset="2"/>
+              </a:rPr>
+              <a:t>So: Do </a:t>
+            </a:r>
+            <a:r>
+              <a:rPr lang="de-CH" dirty="0" err="1" smtClean="0">
+                <a:sym typeface="Wingdings" panose="05000000000000000000" pitchFamily="2" charset="2"/>
+              </a:rPr>
+              <a:t>the</a:t>
+            </a:r>
+            <a:r>
+              <a:rPr lang="de-CH" dirty="0" smtClean="0">
+                <a:sym typeface="Wingdings" panose="05000000000000000000" pitchFamily="2" charset="2"/>
+              </a:rPr>
+              <a:t> </a:t>
+            </a:r>
+            <a:r>
+              <a:rPr lang="de-CH" dirty="0" err="1" smtClean="0">
+                <a:sym typeface="Wingdings" panose="05000000000000000000" pitchFamily="2" charset="2"/>
+              </a:rPr>
+              <a:t>opposite</a:t>
+            </a:r>
+            <a:r>
+              <a:rPr lang="de-CH" dirty="0" smtClean="0">
+                <a:sym typeface="Wingdings" panose="05000000000000000000" pitchFamily="2" charset="2"/>
+              </a:rPr>
+              <a:t>, </a:t>
+            </a:r>
+            <a:r>
+              <a:rPr lang="de-CH" dirty="0" err="1" smtClean="0">
+                <a:sym typeface="Wingdings" panose="05000000000000000000" pitchFamily="2" charset="2"/>
+              </a:rPr>
+              <a:t>sharpen</a:t>
+            </a:r>
+            <a:r>
+              <a:rPr lang="de-CH" dirty="0" smtClean="0">
+                <a:sym typeface="Wingdings" panose="05000000000000000000" pitchFamily="2" charset="2"/>
+              </a:rPr>
+              <a:t> </a:t>
+            </a:r>
+            <a:r>
+              <a:rPr lang="de-CH" dirty="0" err="1" smtClean="0">
+                <a:sym typeface="Wingdings" panose="05000000000000000000" pitchFamily="2" charset="2"/>
+              </a:rPr>
+              <a:t>the</a:t>
+            </a:r>
+            <a:r>
+              <a:rPr lang="de-CH" dirty="0" smtClean="0">
+                <a:sym typeface="Wingdings" panose="05000000000000000000" pitchFamily="2" charset="2"/>
+              </a:rPr>
+              <a:t> </a:t>
+            </a:r>
+            <a:r>
+              <a:rPr lang="de-CH" dirty="0" err="1" smtClean="0">
+                <a:sym typeface="Wingdings" panose="05000000000000000000" pitchFamily="2" charset="2"/>
+              </a:rPr>
+              <a:t>image</a:t>
+            </a:r>
+            <a:r>
+              <a:rPr lang="de-CH" dirty="0" smtClean="0">
+                <a:sym typeface="Wingdings" panose="05000000000000000000" pitchFamily="2" charset="2"/>
+              </a:rPr>
+              <a:t>:</a:t>
+            </a:r>
+          </a:p>
+          <a:p>
+            <a:pPr lvl="1"/>
+            <a:r>
+              <a:rPr lang="de-CH" dirty="0" smtClean="0">
+                <a:sym typeface="Wingdings" panose="05000000000000000000" pitchFamily="2" charset="2"/>
+              </a:rPr>
+              <a:t> </a:t>
+            </a:r>
+            <a:r>
+              <a:rPr lang="de-CH" dirty="0" err="1" smtClean="0">
+                <a:sym typeface="Wingdings" panose="05000000000000000000" pitchFamily="2" charset="2"/>
+              </a:rPr>
+              <a:t>Only</a:t>
+            </a:r>
+            <a:r>
+              <a:rPr lang="de-CH" dirty="0" smtClean="0">
+                <a:sym typeface="Wingdings" panose="05000000000000000000" pitchFamily="2" charset="2"/>
+              </a:rPr>
+              <a:t> </a:t>
+            </a:r>
+            <a:r>
+              <a:rPr lang="de-CH" dirty="0" err="1" smtClean="0">
+                <a:sym typeface="Wingdings" panose="05000000000000000000" pitchFamily="2" charset="2"/>
+              </a:rPr>
+              <a:t>worked</a:t>
+            </a:r>
+            <a:r>
+              <a:rPr lang="de-CH" dirty="0" smtClean="0">
+                <a:sym typeface="Wingdings" panose="05000000000000000000" pitchFamily="2" charset="2"/>
+              </a:rPr>
+              <a:t> </a:t>
+            </a:r>
+            <a:r>
+              <a:rPr lang="de-CH" dirty="0" err="1" smtClean="0">
+                <a:sym typeface="Wingdings" panose="05000000000000000000" pitchFamily="2" charset="2"/>
+              </a:rPr>
+              <a:t>for</a:t>
+            </a:r>
+            <a:r>
+              <a:rPr lang="de-CH" dirty="0" smtClean="0">
+                <a:sym typeface="Wingdings" panose="05000000000000000000" pitchFamily="2" charset="2"/>
+              </a:rPr>
+              <a:t> </a:t>
+            </a:r>
+            <a:r>
+              <a:rPr lang="de-CH" dirty="0" err="1" smtClean="0">
+                <a:sym typeface="Wingdings" panose="05000000000000000000" pitchFamily="2" charset="2"/>
+              </a:rPr>
+              <a:t>certain</a:t>
+            </a:r>
+            <a:r>
+              <a:rPr lang="de-CH" dirty="0" smtClean="0">
+                <a:sym typeface="Wingdings" panose="05000000000000000000" pitchFamily="2" charset="2"/>
+              </a:rPr>
+              <a:t> </a:t>
+            </a:r>
+            <a:r>
+              <a:rPr lang="de-CH" dirty="0" err="1" smtClean="0">
+                <a:sym typeface="Wingdings" panose="05000000000000000000" pitchFamily="2" charset="2"/>
+              </a:rPr>
+              <a:t>images</a:t>
+            </a:r>
+            <a:r>
+              <a:rPr lang="de-CH" dirty="0" smtClean="0">
+                <a:sym typeface="Wingdings" panose="05000000000000000000" pitchFamily="2" charset="2"/>
+              </a:rPr>
+              <a:t> (not </a:t>
+            </a:r>
+            <a:r>
+              <a:rPr lang="de-CH" dirty="0" err="1" smtClean="0">
+                <a:sym typeface="Wingdings" panose="05000000000000000000" pitchFamily="2" charset="2"/>
+              </a:rPr>
+              <a:t>for</a:t>
+            </a:r>
+            <a:r>
+              <a:rPr lang="de-CH" dirty="0" smtClean="0">
+                <a:sym typeface="Wingdings" panose="05000000000000000000" pitchFamily="2" charset="2"/>
+              </a:rPr>
+              <a:t> simple </a:t>
+            </a:r>
+            <a:r>
+              <a:rPr lang="de-CH" dirty="0" err="1" smtClean="0">
+                <a:sym typeface="Wingdings" panose="05000000000000000000" pitchFamily="2" charset="2"/>
+              </a:rPr>
+              <a:t>images</a:t>
+            </a:r>
+            <a:r>
+              <a:rPr lang="de-CH" dirty="0" smtClean="0">
+                <a:sym typeface="Wingdings" panose="05000000000000000000" pitchFamily="2" charset="2"/>
+              </a:rPr>
+              <a:t> </a:t>
+            </a:r>
+            <a:r>
+              <a:rPr lang="de-CH" dirty="0" err="1" smtClean="0">
+                <a:sym typeface="Wingdings" panose="05000000000000000000" pitchFamily="2" charset="2"/>
+              </a:rPr>
+              <a:t>like</a:t>
+            </a:r>
+            <a:r>
+              <a:rPr lang="de-CH" dirty="0" smtClean="0">
+                <a:sym typeface="Wingdings" panose="05000000000000000000" pitchFamily="2" charset="2"/>
+              </a:rPr>
+              <a:t> </a:t>
+            </a:r>
+            <a:r>
+              <a:rPr lang="de-CH" dirty="0" err="1" smtClean="0">
+                <a:sym typeface="Wingdings" panose="05000000000000000000" pitchFamily="2" charset="2"/>
+              </a:rPr>
+              <a:t>perfect</a:t>
+            </a:r>
+            <a:r>
+              <a:rPr lang="de-CH" dirty="0" smtClean="0">
+                <a:sym typeface="Wingdings" panose="05000000000000000000" pitchFamily="2" charset="2"/>
+              </a:rPr>
+              <a:t> </a:t>
+            </a:r>
+            <a:r>
+              <a:rPr lang="de-CH" dirty="0" err="1" smtClean="0">
+                <a:sym typeface="Wingdings" panose="05000000000000000000" pitchFamily="2" charset="2"/>
+              </a:rPr>
+              <a:t>checkerboard</a:t>
+            </a:r>
+            <a:r>
+              <a:rPr lang="de-CH" dirty="0" smtClean="0">
+                <a:sym typeface="Wingdings" panose="05000000000000000000" pitchFamily="2" charset="2"/>
+              </a:rPr>
+              <a:t>)</a:t>
+            </a:r>
+          </a:p>
+          <a:p>
+            <a:r>
+              <a:rPr lang="de-CH" dirty="0" smtClean="0">
+                <a:sym typeface="Wingdings" panose="05000000000000000000" pitchFamily="2" charset="2"/>
+              </a:rPr>
+              <a:t>Best (</a:t>
+            </a:r>
+            <a:r>
+              <a:rPr lang="de-CH" dirty="0" err="1" smtClean="0">
+                <a:sym typeface="Wingdings" panose="05000000000000000000" pitchFamily="2" charset="2"/>
+              </a:rPr>
+              <a:t>and</a:t>
+            </a:r>
+            <a:r>
+              <a:rPr lang="de-CH" dirty="0" smtClean="0">
+                <a:sym typeface="Wingdings" panose="05000000000000000000" pitchFamily="2" charset="2"/>
+              </a:rPr>
+              <a:t> </a:t>
+            </a:r>
+            <a:r>
+              <a:rPr lang="de-CH" dirty="0" err="1" smtClean="0">
+                <a:sym typeface="Wingdings" panose="05000000000000000000" pitchFamily="2" charset="2"/>
+              </a:rPr>
+              <a:t>easiest</a:t>
+            </a:r>
+            <a:r>
+              <a:rPr lang="de-CH" dirty="0" smtClean="0">
+                <a:sym typeface="Wingdings" panose="05000000000000000000" pitchFamily="2" charset="2"/>
+              </a:rPr>
+              <a:t>) </a:t>
+            </a:r>
+            <a:r>
+              <a:rPr lang="de-CH" dirty="0" err="1" smtClean="0">
+                <a:sym typeface="Wingdings" panose="05000000000000000000" pitchFamily="2" charset="2"/>
+              </a:rPr>
+              <a:t>solution</a:t>
+            </a:r>
+            <a:r>
+              <a:rPr lang="de-CH" dirty="0" smtClean="0">
+                <a:sym typeface="Wingdings" panose="05000000000000000000" pitchFamily="2" charset="2"/>
+              </a:rPr>
+              <a:t>: </a:t>
+            </a:r>
+            <a:r>
+              <a:rPr lang="de-CH" dirty="0" err="1" smtClean="0">
+                <a:sym typeface="Wingdings" panose="05000000000000000000" pitchFamily="2" charset="2"/>
+              </a:rPr>
+              <a:t>reduce</a:t>
+            </a:r>
+            <a:r>
+              <a:rPr lang="de-CH" dirty="0" smtClean="0">
+                <a:sym typeface="Wingdings" panose="05000000000000000000" pitchFamily="2" charset="2"/>
+              </a:rPr>
+              <a:t> </a:t>
+            </a:r>
+            <a:r>
+              <a:rPr lang="de-CH" dirty="0" err="1" smtClean="0">
+                <a:sym typeface="Wingdings" panose="05000000000000000000" pitchFamily="2" charset="2"/>
+              </a:rPr>
+              <a:t>the</a:t>
+            </a:r>
+            <a:r>
+              <a:rPr lang="de-CH" dirty="0" smtClean="0">
+                <a:sym typeface="Wingdings" panose="05000000000000000000" pitchFamily="2" charset="2"/>
+              </a:rPr>
+              <a:t> </a:t>
+            </a:r>
+            <a:r>
+              <a:rPr lang="de-CH" dirty="0" err="1" smtClean="0">
+                <a:sym typeface="Wingdings" panose="05000000000000000000" pitchFamily="2" charset="2"/>
+              </a:rPr>
+              <a:t>colors</a:t>
+            </a:r>
+            <a:r>
+              <a:rPr lang="de-CH" dirty="0" smtClean="0">
+                <a:sym typeface="Wingdings" panose="05000000000000000000" pitchFamily="2" charset="2"/>
+              </a:rPr>
+              <a:t> </a:t>
+            </a:r>
+            <a:r>
+              <a:rPr lang="de-CH" dirty="0" err="1" smtClean="0">
+                <a:sym typeface="Wingdings" panose="05000000000000000000" pitchFamily="2" charset="2"/>
+              </a:rPr>
+              <a:t>of</a:t>
+            </a:r>
+            <a:r>
+              <a:rPr lang="de-CH" dirty="0" smtClean="0">
+                <a:sym typeface="Wingdings" panose="05000000000000000000" pitchFamily="2" charset="2"/>
+              </a:rPr>
+              <a:t> </a:t>
+            </a:r>
+            <a:r>
+              <a:rPr lang="de-CH" dirty="0" err="1" smtClean="0">
+                <a:sym typeface="Wingdings" panose="05000000000000000000" pitchFamily="2" charset="2"/>
+              </a:rPr>
+              <a:t>the</a:t>
+            </a:r>
+            <a:r>
+              <a:rPr lang="de-CH" dirty="0" smtClean="0">
+                <a:sym typeface="Wingdings" panose="05000000000000000000" pitchFamily="2" charset="2"/>
+              </a:rPr>
+              <a:t> </a:t>
+            </a:r>
+            <a:r>
+              <a:rPr lang="de-CH" dirty="0" err="1" smtClean="0">
+                <a:sym typeface="Wingdings" panose="05000000000000000000" pitchFamily="2" charset="2"/>
+              </a:rPr>
+              <a:t>image</a:t>
+            </a:r>
+            <a:endParaRPr lang="de-CH" dirty="0" smtClean="0"/>
+          </a:p>
+          <a:p>
+            <a:pPr lvl="1"/>
+            <a:endParaRPr lang="de-CH" dirty="0" smtClean="0"/>
+          </a:p>
+          <a:p>
+            <a:pPr lvl="1"/>
+            <a:endParaRPr lang="de-CH" dirty="0" smtClean="0"/>
+          </a:p>
+          <a:p>
+            <a:endParaRPr lang="de-CH" dirty="0"/>
+          </a:p>
+        </p:txBody>
+      </p:sp>
+    </p:spTree>
+    <p:extLst>
+      <p:ext uri="{BB962C8B-B14F-4D97-AF65-F5344CB8AC3E}">
+        <p14:creationId xmlns:p14="http://schemas.microsoft.com/office/powerpoint/2010/main" val="1975917876"/>
+      </p:ext>
+    </p:extLst>
+  </p:cSld>
+  <p:clrMapOvr>
+    <a:masterClrMapping/>
+  </p:clrMapOvr>
+  <p:timing>
+    <p:tnLst>
+      <p:par>
+        <p:cTn id="1" dur="indefinite" restart="never" nodeType="tmRoot"/>
+      </p:par>
+    </p:tnLst>
+  </p:timing>
+</p:sld>
+</file>
+
+<file path=ppt/slides/slide12.xml><?xml version="1.0" encoding="utf-8"?>
+<p:sld xmlns:a="http://schemas.openxmlformats.org/drawingml/2006/main" xmlns:r="http://schemas.openxmlformats.org/officeDocument/2006/relationships" xmlns:p="http://schemas.openxmlformats.org/presentationml/2006/main">
+  <p:cSld>
+    <p:spTree>
+      <p:nvGrpSpPr>
+        <p:cNvPr id="1" name=""/>
+        <p:cNvGrpSpPr/>
+        <p:nvPr/>
+      </p:nvGrpSpPr>
+      <p:grpSpPr>
+        <a:xfrm>
+          <a:off x="0" y="0"/>
+          <a:ext cx="0" cy="0"/>
+          <a:chOff x="0" y="0"/>
+          <a:chExt cx="0" cy="0"/>
+        </a:xfrm>
+      </p:grpSpPr>
+      <p:sp>
+        <p:nvSpPr>
+          <p:cNvPr id="2" name="Title 1"/>
+          <p:cNvSpPr>
+            <a:spLocks noGrp="1"/>
+          </p:cNvSpPr>
+          <p:nvPr>
+            <p:ph type="title"/>
           </p:nvPr>
         </p:nvSpPr>
         <p:spPr/>
@@ -4692,6 +4737,41 @@
           <a:p>
             <a:r>
               <a:rPr lang="de-CH" dirty="0" err="1" smtClean="0"/>
+              <a:t>Conlusion</a:t>
+            </a:r>
+            <a:r>
+              <a:rPr lang="de-CH" dirty="0" smtClean="0"/>
+              <a:t> (TODO </a:t>
+            </a:r>
+            <a:r>
+              <a:rPr lang="de-CH" dirty="0" err="1" smtClean="0"/>
+              <a:t>maybe</a:t>
+            </a:r>
+            <a:r>
+              <a:rPr lang="de-CH" dirty="0" smtClean="0"/>
+              <a:t>?)</a:t>
+            </a:r>
+            <a:endParaRPr lang="de-CH" dirty="0"/>
+          </a:p>
+        </p:txBody>
+      </p:sp>
+      <p:sp>
+        <p:nvSpPr>
+          <p:cNvPr id="3" name="Content Placeholder 2"/>
+          <p:cNvSpPr>
+            <a:spLocks noGrp="1"/>
+          </p:cNvSpPr>
+          <p:nvPr>
+            <p:ph idx="1"/>
+          </p:nvPr>
+        </p:nvSpPr>
+        <p:spPr/>
+        <p:txBody>
+          <a:bodyPr/>
+          <a:lstStyle/>
+          <a:p>
+            <a:r>
+              <a:rPr lang="de-CH" dirty="0" err="1" smtClean="0"/>
               <a:t>Our</a:t>
             </a:r>
             <a:r>
@@ -4748,7 +4828,7 @@
             <a:pPr lvl="1"/>
             <a:r>
               <a:rPr lang="de-CH" dirty="0" smtClean="0"/>
-              <a:t>Way </a:t>
+              <a:t>Even </a:t>
             </a:r>
             <a:r>
               <a:rPr lang="de-CH" dirty="0" err="1" smtClean="0"/>
@@ -4768,7 +4848,23 @@
             </a:r>
             <a:r>
               <a:rPr lang="de-CH" dirty="0" err="1" smtClean="0"/>
-              <a:t>sometimes</a:t>
+              <a:t>for</a:t>
+            </a:r>
+            <a:r>
+              <a:rPr lang="de-CH" dirty="0" smtClean="0"/>
+              <a:t> </a:t>
+            </a:r>
+            <a:r>
+              <a:rPr lang="de-CH" dirty="0" err="1" smtClean="0"/>
+              <a:t>certain</a:t>
+            </a:r>
+            <a:r>
+              <a:rPr lang="de-CH" dirty="0" smtClean="0"/>
+              <a:t> </a:t>
+            </a:r>
+            <a:r>
+              <a:rPr lang="de-CH" dirty="0" err="1" smtClean="0"/>
+              <a:t>cases</a:t>
             </a:r>
             <a:r>
               <a:rPr lang="de-CH" dirty="0" smtClean="0"/>
@@ -4797,40 +4893,21 @@
             </a:r>
             <a:r>
               <a:rPr lang="de-CH" dirty="0" smtClean="0"/>
-              <a:t>, but </a:t>
-            </a:r>
-            <a:r>
-              <a:rPr lang="de-CH" dirty="0" err="1" smtClean="0"/>
-              <a:t>doen’t</a:t>
-            </a:r>
-            <a:r>
-              <a:rPr lang="de-CH" dirty="0" smtClean="0"/>
-              <a:t> </a:t>
-            </a:r>
-            <a:r>
-              <a:rPr lang="de-CH" dirty="0" err="1" smtClean="0"/>
-              <a:t>come</a:t>
-            </a:r>
-            <a:r>
-              <a:rPr lang="de-CH" dirty="0" smtClean="0"/>
-              <a:t> </a:t>
-            </a:r>
-            <a:r>
-              <a:rPr lang="de-CH" dirty="0" err="1" smtClean="0"/>
-              <a:t>close</a:t>
-            </a:r>
-            <a:r>
-              <a:rPr lang="de-CH" dirty="0" smtClean="0"/>
-              <a:t> </a:t>
-            </a:r>
-            <a:r>
-              <a:rPr lang="de-CH" dirty="0" err="1" smtClean="0"/>
-              <a:t>to</a:t>
-            </a:r>
-            <a:r>
-              <a:rPr lang="de-CH" dirty="0" smtClean="0"/>
-              <a:t> PNG</a:t>
-            </a:r>
+              <a:t>, but PNG </a:t>
+            </a:r>
+            <a:r>
+              <a:rPr lang="de-CH" dirty="0" err="1" smtClean="0"/>
+              <a:t>is</a:t>
+            </a:r>
+            <a:r>
+              <a:rPr lang="de-CH" dirty="0"/>
+              <a:t> </a:t>
+            </a:r>
+            <a:r>
+              <a:rPr lang="de-CH" smtClean="0"/>
+              <a:t>better</a:t>
+            </a:r>
+            <a:endParaRPr lang="de-CH" dirty="0" smtClean="0"/>
           </a:p>
         </p:txBody>
       </p:sp>
@@ -4854,7 +4931,7 @@
 </p:sld>
 </file>
 
-<file path=ppt/slides/slide12.xml><?xml version="1.0" encoding="utf-8"?>
+<file path=ppt/slides/slide13.xml><?xml version="1.0" encoding="utf-8"?>
 <p:sld xmlns:a="http://schemas.openxmlformats.org/drawingml/2006/main" xmlns:r="http://schemas.openxmlformats.org/officeDocument/2006/relationships" xmlns:p="http://schemas.openxmlformats.org/presentationml/2006/main">
   <p:cSld>
     <p:spTree>
@@ -6110,34 +6187,6 @@
           <a:bodyPr/>
           <a:lstStyle/>
           <a:p>
-            <a:r>
-              <a:rPr lang="de-CH" b="1" dirty="0" smtClean="0"/>
-              <a:t>Problem</a:t>
-            </a:r>
-            <a:r>
-              <a:rPr lang="de-CH" dirty="0" smtClean="0"/>
-              <a:t>: </a:t>
-            </a:r>
-            <a:r>
-              <a:rPr lang="de-CH" dirty="0" err="1"/>
-              <a:t>Finding</a:t>
-            </a:r>
-            <a:r>
-              <a:rPr lang="de-CH" dirty="0"/>
-              <a:t> </a:t>
-            </a:r>
-            <a:r>
-              <a:rPr lang="de-CH" dirty="0" err="1"/>
-              <a:t>repeating</a:t>
-            </a:r>
-            <a:r>
-              <a:rPr lang="de-CH" dirty="0"/>
-              <a:t> </a:t>
-            </a:r>
-            <a:r>
-              <a:rPr lang="de-CH" dirty="0" err="1" smtClean="0"/>
-              <a:t>patterns</a:t>
-            </a:r>
             <a:endParaRPr lang="de-CH" dirty="0"/>
           </a:p>
         </p:txBody>
@@ -6154,659 +6203,578 @@
         </p:nvSpPr>
         <p:spPr/>
         <p:txBody>
-          <a:bodyPr>
-            <a:normAutofit fontScale="92500" lnSpcReduction="20000"/>
+          <a:bodyPr/>
+          <a:lstStyle/>
+          <a:p>
+            <a:endParaRPr lang="de-CH" dirty="0"/>
+          </a:p>
+        </p:txBody>
+      </p:sp>
+      <p:sp>
+        <p:nvSpPr>
+          <p:cNvPr id="4" name="TextBox 3"/>
+          <p:cNvSpPr txBox="1"/>
+          <p:nvPr/>
+        </p:nvSpPr>
+        <p:spPr>
+          <a:xfrm>
+            <a:off x="1553537" y="928985"/>
+            <a:ext cx="1813302" cy="923330"/>
+          </a:xfrm>
+          <a:prstGeom prst="rect">
+            <a:avLst/>
+          </a:prstGeom>
+        </p:spPr>
+        <p:style>
+          <a:lnRef idx="2">
+            <a:schemeClr val="dk1"/>
+          </a:lnRef>
+          <a:fillRef idx="1">
+            <a:schemeClr val="lt1"/>
+          </a:fillRef>
+          <a:effectRef idx="0">
+            <a:schemeClr val="dk1"/>
+          </a:effectRef>
+          <a:fontRef idx="minor">
+            <a:schemeClr val="dk1"/>
+          </a:fontRef>
+        </p:style>
+        <p:txBody>
+          <a:bodyPr wrap="square" rtlCol="0">
+            <a:spAutoFit/>
           </a:bodyPr>
           <a:lstStyle/>
           <a:p>
             <a:r>
-              <a:rPr lang="de-CH" b="1" dirty="0" smtClean="0">
-                <a:sym typeface="Wingdings" panose="05000000000000000000" pitchFamily="2" charset="2"/>
-              </a:rPr>
-              <a:t>Naive </a:t>
-            </a:r>
-            <a:r>
-              <a:rPr lang="de-CH" b="1" dirty="0" err="1" smtClean="0">
-                <a:sym typeface="Wingdings" panose="05000000000000000000" pitchFamily="2" charset="2"/>
-              </a:rPr>
-              <a:t>solution</a:t>
-            </a:r>
-            <a:r>
-              <a:rPr lang="de-CH" b="1" dirty="0" smtClean="0">
-                <a:sym typeface="Wingdings" panose="05000000000000000000" pitchFamily="2" charset="2"/>
-              </a:rPr>
-              <a:t>: </a:t>
-            </a:r>
-            <a:r>
-              <a:rPr lang="de-CH" dirty="0" err="1" smtClean="0"/>
-              <a:t>compare</a:t>
-            </a:r>
-            <a:r>
-              <a:rPr lang="de-CH" dirty="0" smtClean="0"/>
-              <a:t> </a:t>
-            </a:r>
-            <a:r>
-              <a:rPr lang="de-CH" dirty="0" err="1" smtClean="0"/>
-              <a:t>each</a:t>
-            </a:r>
-            <a:r>
-              <a:rPr lang="de-CH" dirty="0" smtClean="0"/>
-              <a:t> pair </a:t>
-            </a:r>
-            <a:r>
-              <a:rPr lang="de-CH" dirty="0" err="1" smtClean="0"/>
-              <a:t>of</a:t>
-            </a:r>
-            <a:r>
-              <a:rPr lang="de-CH" dirty="0" smtClean="0"/>
-              <a:t> </a:t>
-            </a:r>
-            <a:r>
-              <a:rPr lang="de-CH" dirty="0" err="1" smtClean="0"/>
-              <a:t>pixels</a:t>
-            </a:r>
-            <a:r>
-              <a:rPr lang="de-CH" dirty="0" smtClean="0"/>
-              <a:t> </a:t>
-            </a:r>
-            <a:r>
-              <a:rPr lang="de-CH" dirty="0" err="1" smtClean="0"/>
-              <a:t>to</a:t>
-            </a:r>
-            <a:r>
-              <a:rPr lang="de-CH" dirty="0" smtClean="0"/>
-              <a:t> </a:t>
-            </a:r>
-            <a:r>
-              <a:rPr lang="de-CH" dirty="0" err="1" smtClean="0"/>
-              <a:t>each</a:t>
-            </a:r>
-            <a:r>
-              <a:rPr lang="de-CH" dirty="0" smtClean="0"/>
-              <a:t> </a:t>
-            </a:r>
-            <a:r>
-              <a:rPr lang="de-CH" dirty="0" err="1" smtClean="0"/>
-              <a:t>other</a:t>
-            </a:r>
-            <a:r>
-              <a:rPr lang="de-CH" dirty="0" smtClean="0"/>
-              <a:t> pair </a:t>
-            </a:r>
-            <a:r>
-              <a:rPr lang="de-CH" dirty="0" err="1" smtClean="0"/>
-              <a:t>of</a:t>
-            </a:r>
-            <a:r>
-              <a:rPr lang="de-CH" dirty="0" smtClean="0"/>
-              <a:t> </a:t>
-            </a:r>
-            <a:r>
-              <a:rPr lang="de-CH" dirty="0" err="1" smtClean="0"/>
-              <a:t>pixels</a:t>
-            </a:r>
-            <a:endParaRPr lang="de-CH" dirty="0" smtClean="0"/>
-          </a:p>
-          <a:p>
-            <a:pPr lvl="1"/>
-            <a:r>
-              <a:rPr lang="de-CH" dirty="0" err="1" smtClean="0"/>
-              <a:t>replace</a:t>
-            </a:r>
-            <a:r>
-              <a:rPr lang="de-CH" dirty="0" smtClean="0"/>
-              <a:t> </a:t>
-            </a:r>
-            <a:r>
-              <a:rPr lang="de-CH" dirty="0" err="1" smtClean="0"/>
-              <a:t>the</a:t>
-            </a:r>
-            <a:r>
-              <a:rPr lang="de-CH" dirty="0" smtClean="0"/>
-              <a:t> </a:t>
-            </a:r>
-            <a:r>
-              <a:rPr lang="de-CH" dirty="0" err="1" smtClean="0"/>
-              <a:t>found</a:t>
-            </a:r>
-            <a:r>
-              <a:rPr lang="de-CH" dirty="0" smtClean="0"/>
-              <a:t> </a:t>
-            </a:r>
-            <a:r>
-              <a:rPr lang="de-CH" dirty="0" err="1" smtClean="0"/>
-              <a:t>pairs</a:t>
-            </a:r>
-            <a:endParaRPr lang="de-CH" dirty="0" smtClean="0"/>
-          </a:p>
-          <a:p>
-            <a:pPr lvl="1"/>
-            <a:r>
-              <a:rPr lang="de-CH" dirty="0" err="1" smtClean="0"/>
-              <a:t>repeat</a:t>
-            </a:r>
-            <a:r>
-              <a:rPr lang="de-CH" dirty="0" smtClean="0"/>
-              <a:t> </a:t>
-            </a:r>
-            <a:r>
-              <a:rPr lang="de-CH" dirty="0" err="1" smtClean="0"/>
-              <a:t>until</a:t>
-            </a:r>
-            <a:r>
-              <a:rPr lang="de-CH" dirty="0" smtClean="0"/>
-              <a:t> </a:t>
-            </a:r>
-            <a:r>
-              <a:rPr lang="de-CH" dirty="0" err="1" smtClean="0"/>
-              <a:t>there</a:t>
-            </a:r>
-            <a:r>
-              <a:rPr lang="de-CH" dirty="0" smtClean="0"/>
-              <a:t> </a:t>
-            </a:r>
-            <a:r>
-              <a:rPr lang="de-CH" dirty="0" err="1" smtClean="0"/>
-              <a:t>are</a:t>
-            </a:r>
-            <a:r>
-              <a:rPr lang="de-CH" dirty="0" smtClean="0"/>
-              <a:t> </a:t>
-            </a:r>
-            <a:r>
-              <a:rPr lang="de-CH" dirty="0" err="1" smtClean="0"/>
-              <a:t>no</a:t>
-            </a:r>
-            <a:r>
-              <a:rPr lang="de-CH" dirty="0" smtClean="0"/>
-              <a:t> </a:t>
-            </a:r>
-            <a:r>
-              <a:rPr lang="de-CH" dirty="0" err="1" smtClean="0"/>
-              <a:t>more</a:t>
-            </a:r>
-            <a:r>
-              <a:rPr lang="de-CH" dirty="0" smtClean="0"/>
-              <a:t> </a:t>
-            </a:r>
-            <a:r>
-              <a:rPr lang="de-CH" dirty="0" err="1" smtClean="0"/>
-              <a:t>pairs</a:t>
-            </a:r>
-            <a:endParaRPr lang="de-CH" dirty="0" smtClean="0"/>
-          </a:p>
-          <a:p>
-            <a:pPr lvl="1"/>
-            <a:r>
-              <a:rPr lang="de-CH" dirty="0" smtClean="0">
-                <a:sym typeface="Wingdings" panose="05000000000000000000" pitchFamily="2" charset="2"/>
-              </a:rPr>
-              <a:t>Works, but </a:t>
-            </a:r>
-            <a:r>
-              <a:rPr lang="de-CH" dirty="0" err="1" smtClean="0">
-                <a:sym typeface="Wingdings" panose="05000000000000000000" pitchFamily="2" charset="2"/>
-              </a:rPr>
-              <a:t>really</a:t>
-            </a:r>
-            <a:r>
-              <a:rPr lang="de-CH" dirty="0" smtClean="0">
-                <a:sym typeface="Wingdings" panose="05000000000000000000" pitchFamily="2" charset="2"/>
-              </a:rPr>
-              <a:t> </a:t>
-            </a:r>
-            <a:r>
-              <a:rPr lang="de-CH" dirty="0" err="1" smtClean="0">
-                <a:sym typeface="Wingdings" panose="05000000000000000000" pitchFamily="2" charset="2"/>
-              </a:rPr>
-              <a:t>slow</a:t>
-            </a:r>
-            <a:r>
-              <a:rPr lang="de-CH" dirty="0" smtClean="0">
-                <a:sym typeface="Wingdings" panose="05000000000000000000" pitchFamily="2" charset="2"/>
-              </a:rPr>
-              <a:t> </a:t>
-            </a:r>
-            <a:r>
-              <a:rPr lang="de-CH" b="1" dirty="0" smtClean="0">
-                <a:sym typeface="Wingdings" panose="05000000000000000000" pitchFamily="2" charset="2"/>
-              </a:rPr>
-              <a:t>O(n^3)</a:t>
-            </a:r>
-          </a:p>
-          <a:p>
-            <a:r>
-              <a:rPr lang="de-CH" b="1" dirty="0" err="1" smtClean="0">
-                <a:sym typeface="Wingdings" panose="05000000000000000000" pitchFamily="2" charset="2"/>
-              </a:rPr>
-              <a:t>Better</a:t>
-            </a:r>
-            <a:r>
-              <a:rPr lang="de-CH" b="1" dirty="0" smtClean="0">
-                <a:sym typeface="Wingdings" panose="05000000000000000000" pitchFamily="2" charset="2"/>
-              </a:rPr>
-              <a:t> </a:t>
-            </a:r>
-            <a:r>
-              <a:rPr lang="de-CH" b="1" dirty="0" err="1" smtClean="0">
-                <a:sym typeface="Wingdings" panose="05000000000000000000" pitchFamily="2" charset="2"/>
-              </a:rPr>
-              <a:t>solution</a:t>
-            </a:r>
-            <a:r>
-              <a:rPr lang="de-CH" b="1" dirty="0" smtClean="0">
-                <a:sym typeface="Wingdings" panose="05000000000000000000" pitchFamily="2" charset="2"/>
-              </a:rPr>
-              <a:t>: </a:t>
-            </a:r>
-            <a:r>
-              <a:rPr lang="de-CH" dirty="0" err="1" smtClean="0">
-                <a:sym typeface="Wingdings" panose="05000000000000000000" pitchFamily="2" charset="2"/>
-              </a:rPr>
-              <a:t>Use</a:t>
-            </a:r>
-            <a:r>
-              <a:rPr lang="de-CH" dirty="0" smtClean="0">
-                <a:sym typeface="Wingdings" panose="05000000000000000000" pitchFamily="2" charset="2"/>
-              </a:rPr>
-              <a:t> a </a:t>
-            </a:r>
-            <a:r>
-              <a:rPr lang="de-CH" dirty="0" err="1" smtClean="0">
-                <a:sym typeface="Wingdings" panose="05000000000000000000" pitchFamily="2" charset="2"/>
-              </a:rPr>
-              <a:t>hashtable</a:t>
-            </a:r>
-            <a:r>
-              <a:rPr lang="de-CH" dirty="0" smtClean="0">
-                <a:sym typeface="Wingdings" panose="05000000000000000000" pitchFamily="2" charset="2"/>
-              </a:rPr>
-              <a:t> </a:t>
-            </a:r>
-            <a:r>
-              <a:rPr lang="de-CH" dirty="0" err="1" smtClean="0">
-                <a:sym typeface="Wingdings" panose="05000000000000000000" pitchFamily="2" charset="2"/>
-              </a:rPr>
-              <a:t>to</a:t>
-            </a:r>
-            <a:r>
-              <a:rPr lang="de-CH" dirty="0" smtClean="0">
-                <a:sym typeface="Wingdings" panose="05000000000000000000" pitchFamily="2" charset="2"/>
-              </a:rPr>
-              <a:t> </a:t>
-            </a:r>
-            <a:r>
-              <a:rPr lang="de-CH" dirty="0" err="1" smtClean="0">
-                <a:sym typeface="Wingdings" panose="05000000000000000000" pitchFamily="2" charset="2"/>
-              </a:rPr>
-              <a:t>count</a:t>
-            </a:r>
-            <a:r>
-              <a:rPr lang="de-CH" dirty="0" smtClean="0">
-                <a:sym typeface="Wingdings" panose="05000000000000000000" pitchFamily="2" charset="2"/>
-              </a:rPr>
-              <a:t> </a:t>
-            </a:r>
-            <a:r>
-              <a:rPr lang="de-CH" dirty="0" err="1">
-                <a:sym typeface="Wingdings" panose="05000000000000000000" pitchFamily="2" charset="2"/>
-              </a:rPr>
-              <a:t>t</a:t>
-            </a:r>
-            <a:r>
-              <a:rPr lang="de-CH" dirty="0" err="1" smtClean="0">
-                <a:sym typeface="Wingdings" panose="05000000000000000000" pitchFamily="2" charset="2"/>
-              </a:rPr>
-              <a:t>hat</a:t>
-            </a:r>
-            <a:r>
-              <a:rPr lang="de-CH" dirty="0" smtClean="0">
-                <a:sym typeface="Wingdings" panose="05000000000000000000" pitchFamily="2" charset="2"/>
-              </a:rPr>
-              <a:t> </a:t>
-            </a:r>
-            <a:r>
-              <a:rPr lang="de-CH" dirty="0" err="1" smtClean="0">
-                <a:sym typeface="Wingdings" panose="05000000000000000000" pitchFamily="2" charset="2"/>
-              </a:rPr>
-              <a:t>pairs</a:t>
-            </a:r>
-            <a:r>
-              <a:rPr lang="de-CH" dirty="0" smtClean="0">
-                <a:sym typeface="Wingdings" panose="05000000000000000000" pitchFamily="2" charset="2"/>
-              </a:rPr>
-              <a:t> </a:t>
-            </a:r>
-            <a:r>
-              <a:rPr lang="de-CH" dirty="0" err="1" smtClean="0">
-                <a:sym typeface="Wingdings" panose="05000000000000000000" pitchFamily="2" charset="2"/>
-              </a:rPr>
-              <a:t>occur</a:t>
-            </a:r>
-            <a:r>
-              <a:rPr lang="de-CH" dirty="0" smtClean="0">
-                <a:sym typeface="Wingdings" panose="05000000000000000000" pitchFamily="2" charset="2"/>
-              </a:rPr>
-              <a:t> </a:t>
-            </a:r>
-            <a:r>
-              <a:rPr lang="de-CH" dirty="0" err="1" smtClean="0">
-                <a:sym typeface="Wingdings" panose="05000000000000000000" pitchFamily="2" charset="2"/>
-              </a:rPr>
-              <a:t>more</a:t>
-            </a:r>
-            <a:r>
-              <a:rPr lang="de-CH" dirty="0" smtClean="0">
-                <a:sym typeface="Wingdings" panose="05000000000000000000" pitchFamily="2" charset="2"/>
-              </a:rPr>
-              <a:t> </a:t>
-            </a:r>
-            <a:r>
-              <a:rPr lang="de-CH" dirty="0" err="1" smtClean="0">
-                <a:sym typeface="Wingdings" panose="05000000000000000000" pitchFamily="2" charset="2"/>
-              </a:rPr>
-              <a:t>than</a:t>
-            </a:r>
-            <a:r>
-              <a:rPr lang="de-CH" dirty="0" smtClean="0">
-                <a:sym typeface="Wingdings" panose="05000000000000000000" pitchFamily="2" charset="2"/>
-              </a:rPr>
-              <a:t> </a:t>
-            </a:r>
-            <a:r>
-              <a:rPr lang="de-CH" dirty="0" err="1" smtClean="0">
-                <a:sym typeface="Wingdings" panose="05000000000000000000" pitchFamily="2" charset="2"/>
-              </a:rPr>
-              <a:t>once</a:t>
-            </a:r>
-            <a:endParaRPr lang="de-CH" dirty="0" smtClean="0">
-              <a:sym typeface="Wingdings" panose="05000000000000000000" pitchFamily="2" charset="2"/>
+              <a:rPr lang="en-US" dirty="0">
+                <a:latin typeface="Courier New" panose="02070309020205020404" pitchFamily="49" charset="0"/>
+                <a:cs typeface="Courier New" panose="02070309020205020404" pitchFamily="49" charset="0"/>
+              </a:rPr>
+              <a:t>0 0 0 0 0 0</a:t>
+            </a:r>
+          </a:p>
+          <a:p>
+            <a:r>
+              <a:rPr lang="en-US" dirty="0" smtClean="0">
+                <a:latin typeface="Courier New" panose="02070309020205020404" pitchFamily="49" charset="0"/>
+                <a:cs typeface="Courier New" panose="02070309020205020404" pitchFamily="49" charset="0"/>
+              </a:rPr>
+              <a:t>0 0 </a:t>
+            </a:r>
+            <a:r>
+              <a:rPr lang="en-US" dirty="0">
+                <a:latin typeface="Courier New" panose="02070309020205020404" pitchFamily="49" charset="0"/>
+                <a:cs typeface="Courier New" panose="02070309020205020404" pitchFamily="49" charset="0"/>
+              </a:rPr>
+              <a:t>1 2 </a:t>
+            </a:r>
+            <a:r>
+              <a:rPr lang="en-US" dirty="0" smtClean="0">
+                <a:latin typeface="Courier New" panose="02070309020205020404" pitchFamily="49" charset="0"/>
+                <a:cs typeface="Courier New" panose="02070309020205020404" pitchFamily="49" charset="0"/>
+              </a:rPr>
+              <a:t>0 0</a:t>
+            </a:r>
+            <a:endParaRPr lang="en-US" dirty="0">
+              <a:latin typeface="Courier New" panose="02070309020205020404" pitchFamily="49" charset="0"/>
+              <a:cs typeface="Courier New" panose="02070309020205020404" pitchFamily="49" charset="0"/>
             </a:endParaRPr>
           </a:p>
           <a:p>
-            <a:pPr lvl="1"/>
-            <a:r>
-              <a:rPr lang="de-CH" dirty="0" smtClean="0">
-                <a:sym typeface="Wingdings" panose="05000000000000000000" pitchFamily="2" charset="2"/>
-              </a:rPr>
-              <a:t>Still a </a:t>
-            </a:r>
-            <a:r>
-              <a:rPr lang="de-CH" dirty="0" err="1" smtClean="0">
-                <a:sym typeface="Wingdings" panose="05000000000000000000" pitchFamily="2" charset="2"/>
-              </a:rPr>
-              <a:t>problem</a:t>
-            </a:r>
-            <a:r>
-              <a:rPr lang="de-CH" dirty="0" smtClean="0">
-                <a:sym typeface="Wingdings" panose="05000000000000000000" pitchFamily="2" charset="2"/>
-              </a:rPr>
-              <a:t>: </a:t>
-            </a:r>
-            <a:r>
-              <a:rPr lang="de-CH" dirty="0" err="1" smtClean="0">
-                <a:sym typeface="Wingdings" panose="05000000000000000000" pitchFamily="2" charset="2"/>
-              </a:rPr>
-              <a:t>Hashtable</a:t>
-            </a:r>
-            <a:r>
-              <a:rPr lang="de-CH" dirty="0" smtClean="0">
-                <a:sym typeface="Wingdings" panose="05000000000000000000" pitchFamily="2" charset="2"/>
-              </a:rPr>
-              <a:t> </a:t>
-            </a:r>
-            <a:r>
-              <a:rPr lang="de-CH" dirty="0" err="1" smtClean="0">
-                <a:sym typeface="Wingdings" panose="05000000000000000000" pitchFamily="2" charset="2"/>
-              </a:rPr>
-              <a:t>is</a:t>
-            </a:r>
-            <a:r>
-              <a:rPr lang="de-CH" dirty="0" smtClean="0">
-                <a:sym typeface="Wingdings" panose="05000000000000000000" pitchFamily="2" charset="2"/>
-              </a:rPr>
-              <a:t> </a:t>
-            </a:r>
-            <a:r>
-              <a:rPr lang="de-CH" dirty="0" err="1" smtClean="0">
-                <a:sym typeface="Wingdings" panose="05000000000000000000" pitchFamily="2" charset="2"/>
-              </a:rPr>
-              <a:t>way</a:t>
-            </a:r>
-            <a:r>
-              <a:rPr lang="de-CH" dirty="0" smtClean="0">
-                <a:sym typeface="Wingdings" panose="05000000000000000000" pitchFamily="2" charset="2"/>
-              </a:rPr>
-              <a:t> </a:t>
-            </a:r>
-            <a:r>
-              <a:rPr lang="de-CH" dirty="0" err="1" smtClean="0">
-                <a:sym typeface="Wingdings" panose="05000000000000000000" pitchFamily="2" charset="2"/>
-              </a:rPr>
-              <a:t>too</a:t>
-            </a:r>
-            <a:r>
-              <a:rPr lang="de-CH" dirty="0" smtClean="0">
-                <a:sym typeface="Wingdings" panose="05000000000000000000" pitchFamily="2" charset="2"/>
-              </a:rPr>
-              <a:t> </a:t>
-            </a:r>
-            <a:r>
-              <a:rPr lang="de-CH" dirty="0" err="1" smtClean="0">
-                <a:sym typeface="Wingdings" panose="05000000000000000000" pitchFamily="2" charset="2"/>
-              </a:rPr>
-              <a:t>big</a:t>
-            </a:r>
-            <a:r>
-              <a:rPr lang="de-CH" dirty="0" smtClean="0">
-                <a:sym typeface="Wingdings" panose="05000000000000000000" pitchFamily="2" charset="2"/>
-              </a:rPr>
-              <a:t>!</a:t>
-            </a:r>
-          </a:p>
-          <a:p>
-            <a:pPr lvl="1"/>
-            <a:r>
-              <a:rPr lang="de-CH" dirty="0" smtClean="0">
-                <a:sym typeface="Wingdings" panose="05000000000000000000" pitchFamily="2" charset="2"/>
-              </a:rPr>
-              <a:t> Solution: </a:t>
-            </a:r>
-            <a:r>
-              <a:rPr lang="de-CH" dirty="0" err="1" smtClean="0">
-                <a:sym typeface="Wingdings" panose="05000000000000000000" pitchFamily="2" charset="2"/>
-              </a:rPr>
-              <a:t>Use</a:t>
-            </a:r>
-            <a:r>
-              <a:rPr lang="de-CH" dirty="0" smtClean="0">
-                <a:sym typeface="Wingdings" panose="05000000000000000000" pitchFamily="2" charset="2"/>
-              </a:rPr>
-              <a:t> </a:t>
-            </a:r>
-            <a:r>
-              <a:rPr lang="de-CH" dirty="0" err="1" smtClean="0">
-                <a:sym typeface="Wingdings" panose="05000000000000000000" pitchFamily="2" charset="2"/>
-              </a:rPr>
-              <a:t>matlab</a:t>
-            </a:r>
-            <a:r>
-              <a:rPr lang="de-CH" dirty="0" smtClean="0">
-                <a:sym typeface="Wingdings" panose="05000000000000000000" pitchFamily="2" charset="2"/>
-              </a:rPr>
-              <a:t> </a:t>
-            </a:r>
-            <a:r>
-              <a:rPr lang="de-CH" dirty="0" err="1" smtClean="0">
-                <a:sym typeface="Wingdings" panose="05000000000000000000" pitchFamily="2" charset="2"/>
-              </a:rPr>
-              <a:t>sparse</a:t>
-            </a:r>
-            <a:r>
-              <a:rPr lang="de-CH" dirty="0" smtClean="0">
-                <a:sym typeface="Wingdings" panose="05000000000000000000" pitchFamily="2" charset="2"/>
-              </a:rPr>
-              <a:t> </a:t>
-            </a:r>
-            <a:r>
-              <a:rPr lang="de-CH" dirty="0" err="1" smtClean="0">
-                <a:sym typeface="Wingdings" panose="05000000000000000000" pitchFamily="2" charset="2"/>
-              </a:rPr>
-              <a:t>matrix</a:t>
-            </a:r>
-            <a:r>
-              <a:rPr lang="de-CH" dirty="0" smtClean="0">
-                <a:sym typeface="Wingdings" panose="05000000000000000000" pitchFamily="2" charset="2"/>
-              </a:rPr>
-              <a:t> </a:t>
-            </a:r>
-            <a:r>
-              <a:rPr lang="de-CH" dirty="0" err="1" smtClean="0">
-                <a:sym typeface="Wingdings" panose="05000000000000000000" pitchFamily="2" charset="2"/>
-              </a:rPr>
-              <a:t>function</a:t>
-            </a:r>
-            <a:r>
-              <a:rPr lang="de-CH" dirty="0" smtClean="0">
-                <a:sym typeface="Wingdings" panose="05000000000000000000" pitchFamily="2" charset="2"/>
-              </a:rPr>
-              <a:t> </a:t>
-            </a:r>
-            <a:r>
-              <a:rPr lang="de-CH" dirty="0">
-                <a:sym typeface="Wingdings" panose="05000000000000000000" pitchFamily="2" charset="2"/>
-              </a:rPr>
-              <a:t>(</a:t>
-            </a:r>
-            <a:r>
-              <a:rPr lang="de-CH" dirty="0" err="1" smtClean="0">
-                <a:sym typeface="Wingdings" panose="05000000000000000000" pitchFamily="2" charset="2"/>
-              </a:rPr>
-              <a:t>only</a:t>
-            </a:r>
-            <a:r>
-              <a:rPr lang="de-CH" dirty="0" smtClean="0">
-                <a:sym typeface="Wingdings" panose="05000000000000000000" pitchFamily="2" charset="2"/>
-              </a:rPr>
-              <a:t> </a:t>
-            </a:r>
-            <a:r>
-              <a:rPr lang="de-CH" dirty="0" err="1" smtClean="0">
-                <a:sym typeface="Wingdings" panose="05000000000000000000" pitchFamily="2" charset="2"/>
-              </a:rPr>
-              <a:t>store</a:t>
-            </a:r>
-            <a:r>
-              <a:rPr lang="de-CH" dirty="0" smtClean="0">
-                <a:sym typeface="Wingdings" panose="05000000000000000000" pitchFamily="2" charset="2"/>
-              </a:rPr>
-              <a:t> non-zeros)</a:t>
-            </a:r>
-          </a:p>
-          <a:p>
-            <a:pPr lvl="1"/>
-            <a:r>
-              <a:rPr lang="de-CH" dirty="0" smtClean="0">
-                <a:sym typeface="Wingdings" panose="05000000000000000000" pitchFamily="2" charset="2"/>
-              </a:rPr>
-              <a:t>a </a:t>
-            </a:r>
-            <a:r>
-              <a:rPr lang="de-CH" dirty="0" err="1" smtClean="0">
-                <a:sym typeface="Wingdings" panose="05000000000000000000" pitchFamily="2" charset="2"/>
-              </a:rPr>
-              <a:t>lot</a:t>
-            </a:r>
-            <a:r>
-              <a:rPr lang="de-CH" dirty="0" smtClean="0">
-                <a:sym typeface="Wingdings" panose="05000000000000000000" pitchFamily="2" charset="2"/>
-              </a:rPr>
-              <a:t> </a:t>
-            </a:r>
-            <a:r>
-              <a:rPr lang="de-CH" dirty="0" err="1" smtClean="0">
-                <a:sym typeface="Wingdings" panose="05000000000000000000" pitchFamily="2" charset="2"/>
-              </a:rPr>
-              <a:t>faster</a:t>
-            </a:r>
-            <a:r>
-              <a:rPr lang="de-CH" dirty="0" smtClean="0">
-                <a:sym typeface="Wingdings" panose="05000000000000000000" pitchFamily="2" charset="2"/>
-              </a:rPr>
-              <a:t>!  </a:t>
-            </a:r>
-            <a:r>
-              <a:rPr lang="de-CH" dirty="0" err="1" smtClean="0">
-                <a:sym typeface="Wingdings" panose="05000000000000000000" pitchFamily="2" charset="2"/>
-              </a:rPr>
-              <a:t>worst</a:t>
-            </a:r>
-            <a:r>
-              <a:rPr lang="de-CH" dirty="0" smtClean="0">
-                <a:sym typeface="Wingdings" panose="05000000000000000000" pitchFamily="2" charset="2"/>
-              </a:rPr>
-              <a:t> </a:t>
-            </a:r>
-            <a:r>
-              <a:rPr lang="de-CH" dirty="0" err="1" smtClean="0">
-                <a:sym typeface="Wingdings" panose="05000000000000000000" pitchFamily="2" charset="2"/>
-              </a:rPr>
-              <a:t>case</a:t>
-            </a:r>
-            <a:r>
-              <a:rPr lang="de-CH" dirty="0" smtClean="0">
-                <a:sym typeface="Wingdings" panose="05000000000000000000" pitchFamily="2" charset="2"/>
-              </a:rPr>
-              <a:t> </a:t>
-            </a:r>
-            <a:r>
-              <a:rPr lang="de-CH" b="1" dirty="0" smtClean="0">
-                <a:sym typeface="Wingdings" panose="05000000000000000000" pitchFamily="2" charset="2"/>
-              </a:rPr>
-              <a:t>O(n^2), </a:t>
-            </a:r>
-            <a:r>
-              <a:rPr lang="de-CH" dirty="0" err="1" smtClean="0">
-                <a:sym typeface="Wingdings" panose="05000000000000000000" pitchFamily="2" charset="2"/>
-              </a:rPr>
-              <a:t>best</a:t>
-            </a:r>
-            <a:r>
-              <a:rPr lang="de-CH" dirty="0" smtClean="0">
-                <a:sym typeface="Wingdings" panose="05000000000000000000" pitchFamily="2" charset="2"/>
-              </a:rPr>
-              <a:t> </a:t>
-            </a:r>
-            <a:r>
-              <a:rPr lang="de-CH" dirty="0" err="1" smtClean="0">
-                <a:sym typeface="Wingdings" panose="05000000000000000000" pitchFamily="2" charset="2"/>
-              </a:rPr>
-              <a:t>case</a:t>
-            </a:r>
-            <a:r>
-              <a:rPr lang="de-CH" dirty="0" smtClean="0">
-                <a:sym typeface="Wingdings" panose="05000000000000000000" pitchFamily="2" charset="2"/>
-              </a:rPr>
-              <a:t> </a:t>
-            </a:r>
-            <a:r>
-              <a:rPr lang="de-CH" b="1" dirty="0" smtClean="0">
-                <a:sym typeface="Wingdings" panose="05000000000000000000" pitchFamily="2" charset="2"/>
-              </a:rPr>
-              <a:t>O(n * log(n))</a:t>
-            </a:r>
-            <a:endParaRPr lang="de-CH" b="1" dirty="0" smtClean="0"/>
-          </a:p>
-          <a:p>
-            <a:pPr lvl="2"/>
-            <a:endParaRPr lang="de-CH" dirty="0"/>
+            <a:r>
+              <a:rPr lang="en-US" dirty="0" smtClean="0">
+                <a:latin typeface="Courier New" panose="02070309020205020404" pitchFamily="49" charset="0"/>
+                <a:cs typeface="Courier New" panose="02070309020205020404" pitchFamily="49" charset="0"/>
+              </a:rPr>
+              <a:t>1 2 1 2 1 2</a:t>
+            </a:r>
+            <a:endParaRPr lang="en-US" dirty="0">
+              <a:latin typeface="Courier New" panose="02070309020205020404" pitchFamily="49" charset="0"/>
+              <a:cs typeface="Courier New" panose="02070309020205020404" pitchFamily="49" charset="0"/>
+            </a:endParaRPr>
+          </a:p>
+        </p:txBody>
+      </p:sp>
+      <p:sp>
+        <p:nvSpPr>
+          <p:cNvPr id="7" name="TextBox 6"/>
+          <p:cNvSpPr txBox="1"/>
+          <p:nvPr/>
+        </p:nvSpPr>
+        <p:spPr>
+          <a:xfrm>
+            <a:off x="4614452" y="1288408"/>
+            <a:ext cx="5110735" cy="379100"/>
+          </a:xfrm>
+          <a:prstGeom prst="rect">
+            <a:avLst/>
+          </a:prstGeom>
+        </p:spPr>
+        <p:style>
+          <a:lnRef idx="2">
+            <a:schemeClr val="dk1"/>
+          </a:lnRef>
+          <a:fillRef idx="1">
+            <a:schemeClr val="lt1"/>
+          </a:fillRef>
+          <a:effectRef idx="0">
+            <a:schemeClr val="dk1"/>
+          </a:effectRef>
+          <a:fontRef idx="minor">
+            <a:schemeClr val="dk1"/>
+          </a:fontRef>
+        </p:style>
+        <p:txBody>
+          <a:bodyPr wrap="square" rtlCol="0">
+            <a:spAutoFit/>
+          </a:bodyPr>
+          <a:lstStyle/>
+          <a:p>
+            <a:r>
+              <a:rPr lang="en-US" dirty="0">
+                <a:latin typeface="Courier New" panose="02070309020205020404" pitchFamily="49" charset="0"/>
+                <a:cs typeface="Courier New" panose="02070309020205020404" pitchFamily="49" charset="0"/>
+              </a:rPr>
+              <a:t>0 0 0 0 0 </a:t>
+            </a:r>
+            <a:r>
+              <a:rPr lang="en-US" dirty="0" smtClean="0">
+                <a:latin typeface="Courier New" panose="02070309020205020404" pitchFamily="49" charset="0"/>
+                <a:cs typeface="Courier New" panose="02070309020205020404" pitchFamily="49" charset="0"/>
+              </a:rPr>
+              <a:t>0 0 0 </a:t>
+            </a:r>
+            <a:r>
+              <a:rPr lang="en-US" dirty="0">
+                <a:latin typeface="Courier New" panose="02070309020205020404" pitchFamily="49" charset="0"/>
+                <a:cs typeface="Courier New" panose="02070309020205020404" pitchFamily="49" charset="0"/>
+              </a:rPr>
+              <a:t>1 2 </a:t>
+            </a:r>
+            <a:r>
+              <a:rPr lang="en-US" dirty="0" smtClean="0">
+                <a:latin typeface="Courier New" panose="02070309020205020404" pitchFamily="49" charset="0"/>
+                <a:cs typeface="Courier New" panose="02070309020205020404" pitchFamily="49" charset="0"/>
+              </a:rPr>
+              <a:t>0 0 1 2 1 2 1 2</a:t>
+            </a:r>
+            <a:endParaRPr lang="en-US" dirty="0">
+              <a:latin typeface="Courier New" panose="02070309020205020404" pitchFamily="49" charset="0"/>
+              <a:cs typeface="Courier New" panose="02070309020205020404" pitchFamily="49" charset="0"/>
+            </a:endParaRPr>
+          </a:p>
+        </p:txBody>
+      </p:sp>
+      <p:sp>
+        <p:nvSpPr>
+          <p:cNvPr id="8" name="TextBox 7"/>
+          <p:cNvSpPr txBox="1"/>
+          <p:nvPr/>
+        </p:nvSpPr>
+        <p:spPr>
+          <a:xfrm>
+            <a:off x="5730329" y="2533804"/>
+            <a:ext cx="2266796" cy="1477328"/>
+          </a:xfrm>
+          <a:prstGeom prst="rect">
+            <a:avLst/>
+          </a:prstGeom>
+        </p:spPr>
+        <p:style>
+          <a:lnRef idx="2">
+            <a:schemeClr val="dk1"/>
+          </a:lnRef>
+          <a:fillRef idx="1">
+            <a:schemeClr val="lt1"/>
+          </a:fillRef>
+          <a:effectRef idx="0">
+            <a:schemeClr val="dk1"/>
+          </a:effectRef>
+          <a:fontRef idx="minor">
+            <a:schemeClr val="dk1"/>
+          </a:fontRef>
+        </p:style>
+        <p:txBody>
+          <a:bodyPr wrap="square" rtlCol="0">
+            <a:spAutoFit/>
+          </a:bodyPr>
+          <a:lstStyle/>
+          <a:p>
+            <a:r>
+              <a:rPr lang="en-US" dirty="0">
+                <a:latin typeface="Courier New" panose="02070309020205020404" pitchFamily="49" charset="0"/>
+                <a:cs typeface="Courier New" panose="02070309020205020404" pitchFamily="49" charset="0"/>
+              </a:rPr>
+              <a:t>A</a:t>
+            </a:r>
+            <a:r>
+              <a:rPr lang="en-US" dirty="0" smtClean="0">
+                <a:latin typeface="Courier New" panose="02070309020205020404" pitchFamily="49" charset="0"/>
+                <a:cs typeface="Courier New" panose="02070309020205020404" pitchFamily="49" charset="0"/>
+              </a:rPr>
+              <a:t> </a:t>
+            </a:r>
+            <a:r>
+              <a:rPr lang="en-US" dirty="0" err="1" smtClean="0">
+                <a:latin typeface="Courier New" panose="02070309020205020404" pitchFamily="49" charset="0"/>
+                <a:cs typeface="Courier New" panose="02070309020205020404" pitchFamily="49" charset="0"/>
+              </a:rPr>
+              <a:t>A</a:t>
+            </a:r>
+            <a:r>
+              <a:rPr lang="en-US" dirty="0" smtClean="0">
+                <a:latin typeface="Courier New" panose="02070309020205020404" pitchFamily="49" charset="0"/>
+                <a:cs typeface="Courier New" panose="02070309020205020404" pitchFamily="49" charset="0"/>
+              </a:rPr>
+              <a:t> </a:t>
+            </a:r>
+            <a:r>
+              <a:rPr lang="en-US" dirty="0" err="1" smtClean="0">
+                <a:latin typeface="Courier New" panose="02070309020205020404" pitchFamily="49" charset="0"/>
+                <a:cs typeface="Courier New" panose="02070309020205020404" pitchFamily="49" charset="0"/>
+              </a:rPr>
+              <a:t>A</a:t>
+            </a:r>
+            <a:r>
+              <a:rPr lang="en-US" dirty="0" smtClean="0">
+                <a:latin typeface="Courier New" panose="02070309020205020404" pitchFamily="49" charset="0"/>
+                <a:cs typeface="Courier New" panose="02070309020205020404" pitchFamily="49" charset="0"/>
+              </a:rPr>
+              <a:t> </a:t>
+            </a:r>
+            <a:r>
+              <a:rPr lang="en-US" dirty="0" err="1" smtClean="0">
+                <a:latin typeface="Courier New" panose="02070309020205020404" pitchFamily="49" charset="0"/>
+                <a:cs typeface="Courier New" panose="02070309020205020404" pitchFamily="49" charset="0"/>
+              </a:rPr>
+              <a:t>A</a:t>
+            </a:r>
+            <a:r>
+              <a:rPr lang="en-US" dirty="0" smtClean="0">
+                <a:latin typeface="Courier New" panose="02070309020205020404" pitchFamily="49" charset="0"/>
+                <a:cs typeface="Courier New" panose="02070309020205020404" pitchFamily="49" charset="0"/>
+              </a:rPr>
+              <a:t> B A B </a:t>
+            </a:r>
+            <a:r>
+              <a:rPr lang="en-US" dirty="0" err="1" smtClean="0">
+                <a:latin typeface="Courier New" panose="02070309020205020404" pitchFamily="49" charset="0"/>
+                <a:cs typeface="Courier New" panose="02070309020205020404" pitchFamily="49" charset="0"/>
+              </a:rPr>
+              <a:t>B</a:t>
+            </a:r>
+            <a:endParaRPr lang="en-US" dirty="0" smtClean="0">
+              <a:latin typeface="Courier New" panose="02070309020205020404" pitchFamily="49" charset="0"/>
+              <a:cs typeface="Courier New" panose="02070309020205020404" pitchFamily="49" charset="0"/>
+            </a:endParaRPr>
+          </a:p>
+          <a:p>
+            <a:endParaRPr lang="en-US" dirty="0">
+              <a:latin typeface="Courier New" panose="02070309020205020404" pitchFamily="49" charset="0"/>
+              <a:cs typeface="Courier New" panose="02070309020205020404" pitchFamily="49" charset="0"/>
+            </a:endParaRPr>
+          </a:p>
+          <a:p>
+            <a:r>
+              <a:rPr lang="en-US" dirty="0" err="1" smtClean="0">
+                <a:latin typeface="Courier New" panose="02070309020205020404" pitchFamily="49" charset="0"/>
+                <a:cs typeface="Courier New" panose="02070309020205020404" pitchFamily="49" charset="0"/>
+              </a:rPr>
+              <a:t>Dict</a:t>
+            </a:r>
+            <a:r>
+              <a:rPr lang="en-US" dirty="0" smtClean="0">
+                <a:latin typeface="Courier New" panose="02070309020205020404" pitchFamily="49" charset="0"/>
+                <a:cs typeface="Courier New" panose="02070309020205020404" pitchFamily="49" charset="0"/>
+              </a:rPr>
+              <a:t>:</a:t>
+            </a:r>
+          </a:p>
+          <a:p>
+            <a:r>
+              <a:rPr lang="en-US" dirty="0" smtClean="0">
+                <a:latin typeface="Courier New" panose="02070309020205020404" pitchFamily="49" charset="0"/>
+                <a:cs typeface="Courier New" panose="02070309020205020404" pitchFamily="49" charset="0"/>
+              </a:rPr>
+              <a:t>A: 0 0</a:t>
+            </a:r>
+          </a:p>
+          <a:p>
+            <a:r>
+              <a:rPr lang="en-US" dirty="0" smtClean="0">
+                <a:latin typeface="Courier New" panose="02070309020205020404" pitchFamily="49" charset="0"/>
+                <a:cs typeface="Courier New" panose="02070309020205020404" pitchFamily="49" charset="0"/>
+              </a:rPr>
+              <a:t>B: 1 2</a:t>
+            </a:r>
+            <a:endParaRPr lang="en-US" dirty="0">
+              <a:latin typeface="Courier New" panose="02070309020205020404" pitchFamily="49" charset="0"/>
+              <a:cs typeface="Courier New" panose="02070309020205020404" pitchFamily="49" charset="0"/>
+            </a:endParaRPr>
+          </a:p>
+        </p:txBody>
+      </p:sp>
+      <p:sp>
+        <p:nvSpPr>
+          <p:cNvPr id="9" name="TextBox 8"/>
+          <p:cNvSpPr txBox="1"/>
+          <p:nvPr/>
+        </p:nvSpPr>
+        <p:spPr>
+          <a:xfrm>
+            <a:off x="6032547" y="4806946"/>
+            <a:ext cx="1770849" cy="1754326"/>
+          </a:xfrm>
+          <a:prstGeom prst="rect">
+            <a:avLst/>
+          </a:prstGeom>
+        </p:spPr>
+        <p:style>
+          <a:lnRef idx="2">
+            <a:schemeClr val="dk1"/>
+          </a:lnRef>
+          <a:fillRef idx="1">
+            <a:schemeClr val="lt1"/>
+          </a:fillRef>
+          <a:effectRef idx="0">
+            <a:schemeClr val="dk1"/>
+          </a:effectRef>
+          <a:fontRef idx="minor">
+            <a:schemeClr val="dk1"/>
+          </a:fontRef>
+        </p:style>
+        <p:txBody>
+          <a:bodyPr wrap="square" rtlCol="0">
+            <a:spAutoFit/>
+          </a:bodyPr>
+          <a:lstStyle/>
+          <a:p>
+            <a:r>
+              <a:rPr lang="en-US" dirty="0">
+                <a:latin typeface="Courier New" panose="02070309020205020404" pitchFamily="49" charset="0"/>
+                <a:cs typeface="Courier New" panose="02070309020205020404" pitchFamily="49" charset="0"/>
+              </a:rPr>
+              <a:t>C</a:t>
+            </a:r>
+            <a:r>
+              <a:rPr lang="en-US" dirty="0" smtClean="0">
+                <a:latin typeface="Courier New" panose="02070309020205020404" pitchFamily="49" charset="0"/>
+                <a:cs typeface="Courier New" panose="02070309020205020404" pitchFamily="49" charset="0"/>
+              </a:rPr>
+              <a:t> </a:t>
+            </a:r>
+            <a:r>
+              <a:rPr lang="en-US" dirty="0" err="1" smtClean="0">
+                <a:latin typeface="Courier New" panose="02070309020205020404" pitchFamily="49" charset="0"/>
+                <a:cs typeface="Courier New" panose="02070309020205020404" pitchFamily="49" charset="0"/>
+              </a:rPr>
+              <a:t>C</a:t>
+            </a:r>
+            <a:r>
+              <a:rPr lang="en-US" dirty="0" smtClean="0">
+                <a:latin typeface="Courier New" panose="02070309020205020404" pitchFamily="49" charset="0"/>
+                <a:cs typeface="Courier New" panose="02070309020205020404" pitchFamily="49" charset="0"/>
+              </a:rPr>
+              <a:t> B A B </a:t>
+            </a:r>
+            <a:r>
+              <a:rPr lang="en-US" dirty="0" err="1" smtClean="0">
+                <a:latin typeface="Courier New" panose="02070309020205020404" pitchFamily="49" charset="0"/>
+                <a:cs typeface="Courier New" panose="02070309020205020404" pitchFamily="49" charset="0"/>
+              </a:rPr>
+              <a:t>B</a:t>
+            </a:r>
+            <a:endParaRPr lang="en-US" dirty="0" smtClean="0">
+              <a:latin typeface="Courier New" panose="02070309020205020404" pitchFamily="49" charset="0"/>
+              <a:cs typeface="Courier New" panose="02070309020205020404" pitchFamily="49" charset="0"/>
+            </a:endParaRPr>
+          </a:p>
+          <a:p>
+            <a:endParaRPr lang="en-US" dirty="0">
+              <a:latin typeface="Courier New" panose="02070309020205020404" pitchFamily="49" charset="0"/>
+              <a:cs typeface="Courier New" panose="02070309020205020404" pitchFamily="49" charset="0"/>
+            </a:endParaRPr>
+          </a:p>
+          <a:p>
+            <a:r>
+              <a:rPr lang="en-US" dirty="0" err="1" smtClean="0">
+                <a:latin typeface="Courier New" panose="02070309020205020404" pitchFamily="49" charset="0"/>
+                <a:cs typeface="Courier New" panose="02070309020205020404" pitchFamily="49" charset="0"/>
+              </a:rPr>
+              <a:t>Dict</a:t>
+            </a:r>
+            <a:r>
+              <a:rPr lang="en-US" dirty="0" smtClean="0">
+                <a:latin typeface="Courier New" panose="02070309020205020404" pitchFamily="49" charset="0"/>
+                <a:cs typeface="Courier New" panose="02070309020205020404" pitchFamily="49" charset="0"/>
+              </a:rPr>
+              <a:t>:</a:t>
+            </a:r>
+          </a:p>
+          <a:p>
+            <a:r>
+              <a:rPr lang="en-US" dirty="0" smtClean="0">
+                <a:latin typeface="Courier New" panose="02070309020205020404" pitchFamily="49" charset="0"/>
+                <a:cs typeface="Courier New" panose="02070309020205020404" pitchFamily="49" charset="0"/>
+              </a:rPr>
+              <a:t>A: 0 0</a:t>
+            </a:r>
+          </a:p>
+          <a:p>
+            <a:r>
+              <a:rPr lang="en-US" dirty="0" smtClean="0">
+                <a:latin typeface="Courier New" panose="02070309020205020404" pitchFamily="49" charset="0"/>
+                <a:cs typeface="Courier New" panose="02070309020205020404" pitchFamily="49" charset="0"/>
+              </a:rPr>
+              <a:t>B: 1 2</a:t>
+            </a:r>
+          </a:p>
+          <a:p>
+            <a:r>
+              <a:rPr lang="en-US" dirty="0" smtClean="0">
+                <a:latin typeface="Courier New" panose="02070309020205020404" pitchFamily="49" charset="0"/>
+                <a:cs typeface="Courier New" panose="02070309020205020404" pitchFamily="49" charset="0"/>
+              </a:rPr>
+              <a:t>C: A </a:t>
+            </a:r>
+            <a:r>
+              <a:rPr lang="en-US" dirty="0" err="1" smtClean="0">
+                <a:latin typeface="Courier New" panose="02070309020205020404" pitchFamily="49" charset="0"/>
+                <a:cs typeface="Courier New" panose="02070309020205020404" pitchFamily="49" charset="0"/>
+              </a:rPr>
+              <a:t>A</a:t>
+            </a:r>
+            <a:endParaRPr lang="en-US" dirty="0">
+              <a:latin typeface="Courier New" panose="02070309020205020404" pitchFamily="49" charset="0"/>
+              <a:cs typeface="Courier New" panose="02070309020205020404" pitchFamily="49" charset="0"/>
+            </a:endParaRPr>
+          </a:p>
+        </p:txBody>
+      </p:sp>
+      <p:sp>
+        <p:nvSpPr>
+          <p:cNvPr id="10" name="Right Arrow 9"/>
+          <p:cNvSpPr/>
+          <p:nvPr/>
+        </p:nvSpPr>
+        <p:spPr>
+          <a:xfrm>
+            <a:off x="3504470" y="1339529"/>
+            <a:ext cx="972350" cy="276858"/>
+          </a:xfrm>
+          <a:prstGeom prst="rightArrow">
+            <a:avLst/>
+          </a:prstGeom>
+        </p:spPr>
+        <p:style>
+          <a:lnRef idx="2">
+            <a:schemeClr val="accent2">
+              <a:shade val="50000"/>
+            </a:schemeClr>
+          </a:lnRef>
+          <a:fillRef idx="1">
+            <a:schemeClr val="accent2"/>
+          </a:fillRef>
+          <a:effectRef idx="0">
+            <a:schemeClr val="accent2"/>
+          </a:effectRef>
+          <a:fontRef idx="minor">
+            <a:schemeClr val="lt1"/>
+          </a:fontRef>
+        </p:style>
+        <p:txBody>
+          <a:bodyPr rtlCol="0" anchor="ctr"/>
+          <a:lstStyle/>
+          <a:p>
+            <a:pPr algn="ctr"/>
+            <a:endParaRPr lang="de-CH"/>
+          </a:p>
+        </p:txBody>
+      </p:sp>
+      <p:sp>
+        <p:nvSpPr>
+          <p:cNvPr id="11" name="Down Arrow 10"/>
+          <p:cNvSpPr/>
+          <p:nvPr/>
+        </p:nvSpPr>
+        <p:spPr>
+          <a:xfrm>
+            <a:off x="6716493" y="1795153"/>
+            <a:ext cx="402956" cy="681489"/>
+          </a:xfrm>
+          <a:prstGeom prst="downArrow">
+            <a:avLst/>
+          </a:prstGeom>
+        </p:spPr>
+        <p:style>
+          <a:lnRef idx="2">
+            <a:schemeClr val="accent2">
+              <a:shade val="50000"/>
+            </a:schemeClr>
+          </a:lnRef>
+          <a:fillRef idx="1">
+            <a:schemeClr val="accent2"/>
+          </a:fillRef>
+          <a:effectRef idx="0">
+            <a:schemeClr val="accent2"/>
+          </a:effectRef>
+          <a:fontRef idx="minor">
+            <a:schemeClr val="lt1"/>
+          </a:fontRef>
+        </p:style>
+        <p:txBody>
+          <a:bodyPr rtlCol="0" anchor="ctr"/>
+          <a:lstStyle/>
+          <a:p>
+            <a:pPr algn="ctr"/>
+            <a:endParaRPr lang="de-CH"/>
+          </a:p>
+        </p:txBody>
+      </p:sp>
+      <p:sp>
+        <p:nvSpPr>
+          <p:cNvPr id="12" name="Down Arrow 11"/>
+          <p:cNvSpPr/>
+          <p:nvPr/>
+        </p:nvSpPr>
+        <p:spPr>
+          <a:xfrm>
+            <a:off x="6716493" y="4068294"/>
+            <a:ext cx="402956" cy="681489"/>
+          </a:xfrm>
+          <a:prstGeom prst="downArrow">
+            <a:avLst/>
+          </a:prstGeom>
+        </p:spPr>
+        <p:style>
+          <a:lnRef idx="2">
+            <a:schemeClr val="accent2">
+              <a:shade val="50000"/>
+            </a:schemeClr>
+          </a:lnRef>
+          <a:fillRef idx="1">
+            <a:schemeClr val="accent2"/>
+          </a:fillRef>
+          <a:effectRef idx="0">
+            <a:schemeClr val="accent2"/>
+          </a:effectRef>
+          <a:fontRef idx="minor">
+            <a:schemeClr val="lt1"/>
+          </a:fontRef>
+        </p:style>
+        <p:txBody>
+          <a:bodyPr rtlCol="0" anchor="ctr"/>
+          <a:lstStyle/>
+          <a:p>
+            <a:pPr algn="ctr"/>
+            <a:endParaRPr lang="de-CH"/>
           </a:p>
         </p:txBody>
       </p:sp>
     </p:spTree>
     <p:extLst>
       <p:ext uri="{BB962C8B-B14F-4D97-AF65-F5344CB8AC3E}">
-        <p14:creationId xmlns:p14="http://schemas.microsoft.com/office/powerpoint/2010/main" val="1481416882"/>
+        <p14:creationId xmlns:p14="http://schemas.microsoft.com/office/powerpoint/2010/main" val="1836429464"/>
       </p:ext>
     </p:extLst>
   </p:cSld>
@@ -6852,489 +6820,706 @@
         </p:nvSpPr>
         <p:spPr/>
         <p:txBody>
+          <a:bodyPr/>
+          <a:lstStyle/>
+          <a:p>
+            <a:r>
+              <a:rPr lang="de-CH" b="1" dirty="0" smtClean="0"/>
+              <a:t>Problem</a:t>
+            </a:r>
+            <a:r>
+              <a:rPr lang="de-CH" dirty="0" smtClean="0"/>
+              <a:t>: </a:t>
+            </a:r>
+            <a:r>
+              <a:rPr lang="de-CH" dirty="0" err="1"/>
+              <a:t>Finding</a:t>
+            </a:r>
+            <a:r>
+              <a:rPr lang="de-CH" dirty="0"/>
+              <a:t> </a:t>
+            </a:r>
+            <a:r>
+              <a:rPr lang="de-CH" dirty="0" err="1"/>
+              <a:t>repeating</a:t>
+            </a:r>
+            <a:r>
+              <a:rPr lang="de-CH" dirty="0"/>
+              <a:t> </a:t>
+            </a:r>
+            <a:r>
+              <a:rPr lang="de-CH" dirty="0" err="1" smtClean="0"/>
+              <a:t>patterns</a:t>
+            </a:r>
+            <a:endParaRPr lang="de-CH" dirty="0"/>
+          </a:p>
+        </p:txBody>
+      </p:sp>
+      <p:sp>
+        <p:nvSpPr>
+          <p:cNvPr id="3" name="Content Placeholder 2"/>
+          <p:cNvSpPr>
+            <a:spLocks noGrp="1"/>
+          </p:cNvSpPr>
+          <p:nvPr>
+            <p:ph idx="1"/>
+          </p:nvPr>
+        </p:nvSpPr>
+        <p:spPr/>
+        <p:txBody>
           <a:bodyPr>
-            <a:normAutofit fontScale="90000"/>
+            <a:normAutofit fontScale="92500" lnSpcReduction="20000"/>
           </a:bodyPr>
           <a:lstStyle/>
           <a:p>
             <a:r>
-              <a:rPr lang="de-CH" b="1" dirty="0" smtClean="0"/>
-              <a:t>Problem</a:t>
-            </a:r>
-            <a:r>
-              <a:rPr lang="de-CH" dirty="0" smtClean="0"/>
+              <a:rPr lang="de-CH" b="1" dirty="0" smtClean="0">
+                <a:sym typeface="Wingdings" panose="05000000000000000000" pitchFamily="2" charset="2"/>
+              </a:rPr>
+              <a:t>Naive </a:t>
+            </a:r>
+            <a:r>
+              <a:rPr lang="de-CH" b="1" dirty="0" err="1" smtClean="0">
+                <a:sym typeface="Wingdings" panose="05000000000000000000" pitchFamily="2" charset="2"/>
+              </a:rPr>
+              <a:t>solution</a:t>
+            </a:r>
+            <a:r>
+              <a:rPr lang="de-CH" b="1" dirty="0" smtClean="0">
+                <a:sym typeface="Wingdings" panose="05000000000000000000" pitchFamily="2" charset="2"/>
+              </a:rPr>
               <a:t>: </a:t>
             </a:r>
             <a:r>
-              <a:rPr lang="de-CH" sz="4000" dirty="0" err="1"/>
-              <a:t>Described</a:t>
-            </a:r>
-            <a:r>
-              <a:rPr lang="de-CH" sz="4000" dirty="0"/>
-              <a:t> </a:t>
-            </a:r>
-            <a:r>
-              <a:rPr lang="de-CH" sz="4000" dirty="0" err="1"/>
-              <a:t>algorithm</a:t>
-            </a:r>
-            <a:r>
-              <a:rPr lang="de-CH" sz="4000" dirty="0"/>
-              <a:t> </a:t>
-            </a:r>
-            <a:r>
-              <a:rPr lang="de-CH" sz="4000" dirty="0" err="1"/>
-              <a:t>only</a:t>
-            </a:r>
-            <a:r>
-              <a:rPr lang="de-CH" sz="4000" dirty="0"/>
-              <a:t> </a:t>
-            </a:r>
-            <a:r>
-              <a:rPr lang="de-CH" sz="4000" dirty="0" err="1"/>
-              <a:t>works</a:t>
-            </a:r>
-            <a:r>
-              <a:rPr lang="de-CH" sz="4000" dirty="0"/>
-              <a:t> </a:t>
-            </a:r>
-            <a:r>
-              <a:rPr lang="de-CH" sz="4000" dirty="0" err="1"/>
-              <a:t>for</a:t>
-            </a:r>
-            <a:r>
-              <a:rPr lang="de-CH" sz="4000" dirty="0"/>
-              <a:t> </a:t>
-            </a:r>
-            <a:r>
-              <a:rPr lang="de-CH" sz="4000" dirty="0" err="1"/>
-              <a:t>single</a:t>
-            </a:r>
-            <a:r>
-              <a:rPr lang="de-CH" sz="4000" dirty="0"/>
-              <a:t> </a:t>
-            </a:r>
-            <a:r>
-              <a:rPr lang="de-CH" sz="4000" dirty="0" err="1"/>
-              <a:t>value</a:t>
-            </a:r>
-            <a:r>
-              <a:rPr lang="de-CH" sz="4000" dirty="0"/>
-              <a:t> </a:t>
-            </a:r>
-            <a:r>
-              <a:rPr lang="de-CH" sz="4000" dirty="0" err="1"/>
+              <a:rPr lang="de-CH" dirty="0" err="1" smtClean="0"/>
+              <a:t>compare</a:t>
+            </a:r>
+            <a:r>
+              <a:rPr lang="de-CH" dirty="0" smtClean="0"/>
+              <a:t> </a:t>
+            </a:r>
+            <a:r>
+              <a:rPr lang="de-CH" dirty="0" err="1" smtClean="0"/>
+              <a:t>each</a:t>
+            </a:r>
+            <a:r>
+              <a:rPr lang="de-CH" dirty="0" smtClean="0"/>
+              <a:t> pair </a:t>
+            </a:r>
+            <a:r>
+              <a:rPr lang="de-CH" dirty="0" err="1" smtClean="0"/>
+              <a:t>of</a:t>
+            </a:r>
+            <a:r>
+              <a:rPr lang="de-CH" dirty="0" smtClean="0"/>
+              <a:t> </a:t>
+            </a:r>
+            <a:r>
+              <a:rPr lang="de-CH" dirty="0" err="1" smtClean="0"/>
               <a:t>pixels</a:t>
             </a:r>
             <a:r>
-              <a:rPr lang="de-CH" sz="4000" dirty="0"/>
-              <a:t> (</a:t>
-            </a:r>
-            <a:r>
-              <a:rPr lang="de-CH" sz="4000" dirty="0" err="1"/>
-              <a:t>grayscale</a:t>
-            </a:r>
-            <a:r>
-              <a:rPr lang="de-CH" sz="4000" dirty="0"/>
-              <a:t> </a:t>
-            </a:r>
-            <a:r>
-              <a:rPr lang="de-CH" sz="4000" dirty="0" err="1"/>
-              <a:t>images</a:t>
-            </a:r>
-            <a:r>
-              <a:rPr lang="de-CH" sz="4000" dirty="0"/>
-              <a:t>)</a:t>
-            </a:r>
-            <a:br>
-              <a:rPr lang="de-CH" sz="4000" dirty="0"/>
-            </a:br>
-            <a:endParaRPr lang="de-CH" dirty="0"/>
-          </a:p>
-        </p:txBody>
-      </p:sp>
-      <p:sp>
-        <p:nvSpPr>
-          <p:cNvPr id="3" name="Content Placeholder 2"/>
-          <p:cNvSpPr>
-            <a:spLocks noGrp="1"/>
-          </p:cNvSpPr>
-          <p:nvPr>
-            <p:ph idx="1"/>
-          </p:nvPr>
-        </p:nvSpPr>
-        <p:spPr/>
-        <p:txBody>
-          <a:bodyPr>
-            <a:normAutofit fontScale="92500" lnSpcReduction="10000"/>
-          </a:bodyPr>
-          <a:lstStyle/>
-          <a:p>
-            <a:r>
-              <a:rPr lang="de-CH" dirty="0" err="1" smtClean="0"/>
-              <a:t>We</a:t>
-            </a:r>
-            <a:r>
-              <a:rPr lang="de-CH" dirty="0" smtClean="0"/>
-              <a:t> </a:t>
-            </a:r>
-            <a:r>
-              <a:rPr lang="de-CH" dirty="0" err="1" smtClean="0"/>
-              <a:t>want</a:t>
-            </a:r>
-            <a:r>
-              <a:rPr lang="de-CH" dirty="0" smtClean="0"/>
-              <a:t> RGB!</a:t>
-            </a:r>
-          </a:p>
-          <a:p>
-            <a:r>
-              <a:rPr lang="de-CH" b="1" dirty="0" smtClean="0"/>
-              <a:t>Naive </a:t>
-            </a:r>
-            <a:r>
-              <a:rPr lang="de-CH" b="1" dirty="0" err="1" smtClean="0"/>
+              <a:rPr lang="de-CH" dirty="0" smtClean="0"/>
+              <a:t> </a:t>
+            </a:r>
+            <a:r>
+              <a:rPr lang="de-CH" dirty="0" err="1" smtClean="0"/>
+              <a:t>to</a:t>
+            </a:r>
+            <a:r>
+              <a:rPr lang="de-CH" dirty="0" smtClean="0"/>
+              <a:t> </a:t>
+            </a:r>
+            <a:r>
+              <a:rPr lang="de-CH" dirty="0" err="1" smtClean="0"/>
+              <a:t>each</a:t>
+            </a:r>
+            <a:r>
+              <a:rPr lang="de-CH" dirty="0" smtClean="0"/>
+              <a:t> </a:t>
+            </a:r>
+            <a:r>
+              <a:rPr lang="de-CH" dirty="0" err="1" smtClean="0"/>
+              <a:t>other</a:t>
+            </a:r>
+            <a:r>
+              <a:rPr lang="de-CH" dirty="0" smtClean="0"/>
+              <a:t> pair </a:t>
+            </a:r>
+            <a:r>
+              <a:rPr lang="de-CH" dirty="0" err="1" smtClean="0"/>
+              <a:t>of</a:t>
+            </a:r>
+            <a:r>
+              <a:rPr lang="de-CH" dirty="0" smtClean="0"/>
+              <a:t> </a:t>
+            </a:r>
+            <a:r>
+              <a:rPr lang="de-CH" dirty="0" err="1" smtClean="0"/>
+              <a:t>pixels</a:t>
+            </a:r>
+            <a:endParaRPr lang="de-CH" dirty="0" smtClean="0"/>
+          </a:p>
+          <a:p>
+            <a:pPr lvl="1"/>
+            <a:r>
+              <a:rPr lang="de-CH" dirty="0" err="1" smtClean="0"/>
+              <a:t>replace</a:t>
+            </a:r>
+            <a:r>
+              <a:rPr lang="de-CH" dirty="0" smtClean="0"/>
+              <a:t> </a:t>
+            </a:r>
+            <a:r>
+              <a:rPr lang="de-CH" dirty="0" err="1" smtClean="0"/>
+              <a:t>the</a:t>
+            </a:r>
+            <a:r>
+              <a:rPr lang="de-CH" dirty="0" smtClean="0"/>
+              <a:t> </a:t>
+            </a:r>
+            <a:r>
+              <a:rPr lang="de-CH" dirty="0" err="1" smtClean="0"/>
+              <a:t>found</a:t>
+            </a:r>
+            <a:r>
+              <a:rPr lang="de-CH" dirty="0" smtClean="0"/>
+              <a:t> </a:t>
+            </a:r>
+            <a:r>
+              <a:rPr lang="de-CH" dirty="0" err="1" smtClean="0"/>
+              <a:t>pairs</a:t>
+            </a:r>
+            <a:endParaRPr lang="de-CH" dirty="0" smtClean="0"/>
+          </a:p>
+          <a:p>
+            <a:pPr lvl="1"/>
+            <a:r>
+              <a:rPr lang="de-CH" dirty="0" err="1" smtClean="0"/>
+              <a:t>repeat</a:t>
+            </a:r>
+            <a:r>
+              <a:rPr lang="de-CH" dirty="0" smtClean="0"/>
+              <a:t> </a:t>
+            </a:r>
+            <a:r>
+              <a:rPr lang="de-CH" dirty="0" err="1" smtClean="0"/>
+              <a:t>until</a:t>
+            </a:r>
+            <a:r>
+              <a:rPr lang="de-CH" dirty="0" smtClean="0"/>
+              <a:t> </a:t>
+            </a:r>
+            <a:r>
+              <a:rPr lang="de-CH" dirty="0" err="1" smtClean="0"/>
+              <a:t>there</a:t>
+            </a:r>
+            <a:r>
+              <a:rPr lang="de-CH" dirty="0" smtClean="0"/>
+              <a:t> </a:t>
+            </a:r>
+            <a:r>
+              <a:rPr lang="de-CH" dirty="0" err="1" smtClean="0"/>
+              <a:t>are</a:t>
+            </a:r>
+            <a:r>
+              <a:rPr lang="de-CH" dirty="0" smtClean="0"/>
+              <a:t> </a:t>
+            </a:r>
+            <a:r>
+              <a:rPr lang="de-CH" dirty="0" err="1" smtClean="0"/>
+              <a:t>no</a:t>
+            </a:r>
+            <a:r>
+              <a:rPr lang="de-CH" dirty="0" smtClean="0"/>
+              <a:t> </a:t>
+            </a:r>
+            <a:r>
+              <a:rPr lang="de-CH" dirty="0" err="1" smtClean="0"/>
+              <a:t>more</a:t>
+            </a:r>
+            <a:r>
+              <a:rPr lang="de-CH" dirty="0" smtClean="0"/>
+              <a:t> </a:t>
+            </a:r>
+            <a:r>
+              <a:rPr lang="de-CH" dirty="0" err="1" smtClean="0"/>
+              <a:t>pairs</a:t>
+            </a:r>
+            <a:endParaRPr lang="de-CH" dirty="0" smtClean="0"/>
+          </a:p>
+          <a:p>
+            <a:pPr lvl="1"/>
+            <a:r>
+              <a:rPr lang="de-CH" dirty="0" smtClean="0">
+                <a:sym typeface="Wingdings" panose="05000000000000000000" pitchFamily="2" charset="2"/>
+              </a:rPr>
+              <a:t>Works, but </a:t>
+            </a:r>
+            <a:r>
+              <a:rPr lang="de-CH" dirty="0" err="1" smtClean="0">
+                <a:sym typeface="Wingdings" panose="05000000000000000000" pitchFamily="2" charset="2"/>
+              </a:rPr>
+              <a:t>really</a:t>
+            </a:r>
+            <a:r>
+              <a:rPr lang="de-CH" dirty="0" smtClean="0">
+                <a:sym typeface="Wingdings" panose="05000000000000000000" pitchFamily="2" charset="2"/>
+              </a:rPr>
+              <a:t> </a:t>
+            </a:r>
+            <a:r>
+              <a:rPr lang="de-CH" dirty="0" err="1" smtClean="0">
+                <a:sym typeface="Wingdings" panose="05000000000000000000" pitchFamily="2" charset="2"/>
+              </a:rPr>
+              <a:t>slow</a:t>
+            </a:r>
+            <a:r>
+              <a:rPr lang="de-CH" dirty="0" smtClean="0">
+                <a:sym typeface="Wingdings" panose="05000000000000000000" pitchFamily="2" charset="2"/>
+              </a:rPr>
+              <a:t> </a:t>
+            </a:r>
+            <a:r>
+              <a:rPr lang="de-CH" b="1" dirty="0" smtClean="0">
+                <a:sym typeface="Wingdings" panose="05000000000000000000" pitchFamily="2" charset="2"/>
+              </a:rPr>
+              <a:t>O(n^3)</a:t>
+            </a:r>
+          </a:p>
+          <a:p>
+            <a:r>
+              <a:rPr lang="de-CH" b="1" dirty="0" err="1" smtClean="0">
+                <a:sym typeface="Wingdings" panose="05000000000000000000" pitchFamily="2" charset="2"/>
+              </a:rPr>
+              <a:t>Better</a:t>
+            </a:r>
+            <a:r>
+              <a:rPr lang="de-CH" b="1" dirty="0" smtClean="0">
+                <a:sym typeface="Wingdings" panose="05000000000000000000" pitchFamily="2" charset="2"/>
+              </a:rPr>
+              <a:t> </a:t>
+            </a:r>
+            <a:r>
+              <a:rPr lang="de-CH" b="1" dirty="0" err="1" smtClean="0">
+                <a:sym typeface="Wingdings" panose="05000000000000000000" pitchFamily="2" charset="2"/>
+              </a:rPr>
               <a:t>solution</a:t>
             </a:r>
             <a:r>
-              <a:rPr lang="de-CH" dirty="0" smtClean="0"/>
-              <a:t>: Just </a:t>
-            </a:r>
-            <a:r>
-              <a:rPr lang="de-CH" dirty="0" err="1" smtClean="0"/>
-              <a:t>run</a:t>
-            </a:r>
-            <a:r>
-              <a:rPr lang="de-CH" dirty="0" smtClean="0"/>
-              <a:t> </a:t>
-            </a:r>
-            <a:r>
-              <a:rPr lang="de-CH" dirty="0" err="1" smtClean="0"/>
-              <a:t>algorithm</a:t>
-            </a:r>
-            <a:r>
-              <a:rPr lang="de-CH" dirty="0" smtClean="0"/>
-              <a:t> 3x (</a:t>
-            </a:r>
-            <a:r>
-              <a:rPr lang="de-CH" dirty="0" err="1" smtClean="0"/>
+              <a:rPr lang="de-CH" b="1" dirty="0" smtClean="0">
+                <a:sym typeface="Wingdings" panose="05000000000000000000" pitchFamily="2" charset="2"/>
+              </a:rPr>
+              <a:t>: </a:t>
+            </a:r>
+            <a:r>
+              <a:rPr lang="de-CH" dirty="0" err="1" smtClean="0">
+                <a:sym typeface="Wingdings" panose="05000000000000000000" pitchFamily="2" charset="2"/>
+              </a:rPr>
+              <a:t>Use</a:t>
+            </a:r>
+            <a:r>
+              <a:rPr lang="de-CH" dirty="0" smtClean="0">
+                <a:sym typeface="Wingdings" panose="05000000000000000000" pitchFamily="2" charset="2"/>
+              </a:rPr>
+              <a:t> a </a:t>
+            </a:r>
+            <a:r>
+              <a:rPr lang="de-CH" dirty="0" err="1" smtClean="0">
+                <a:sym typeface="Wingdings" panose="05000000000000000000" pitchFamily="2" charset="2"/>
+              </a:rPr>
+              <a:t>hashtable</a:t>
+            </a:r>
+            <a:r>
+              <a:rPr lang="de-CH" dirty="0" smtClean="0">
+                <a:sym typeface="Wingdings" panose="05000000000000000000" pitchFamily="2" charset="2"/>
+              </a:rPr>
+              <a:t> </a:t>
+            </a:r>
+            <a:r>
+              <a:rPr lang="de-CH" dirty="0" err="1" smtClean="0">
+                <a:sym typeface="Wingdings" panose="05000000000000000000" pitchFamily="2" charset="2"/>
+              </a:rPr>
+              <a:t>to</a:t>
+            </a:r>
+            <a:r>
+              <a:rPr lang="de-CH" dirty="0" smtClean="0">
+                <a:sym typeface="Wingdings" panose="05000000000000000000" pitchFamily="2" charset="2"/>
+              </a:rPr>
+              <a:t> </a:t>
+            </a:r>
+            <a:r>
+              <a:rPr lang="de-CH" dirty="0" err="1" smtClean="0">
+                <a:sym typeface="Wingdings" panose="05000000000000000000" pitchFamily="2" charset="2"/>
+              </a:rPr>
+              <a:t>count</a:t>
+            </a:r>
+            <a:r>
+              <a:rPr lang="de-CH" dirty="0" smtClean="0">
+                <a:sym typeface="Wingdings" panose="05000000000000000000" pitchFamily="2" charset="2"/>
+              </a:rPr>
+              <a:t> </a:t>
+            </a:r>
+            <a:r>
+              <a:rPr lang="de-CH" dirty="0" err="1">
+                <a:sym typeface="Wingdings" panose="05000000000000000000" pitchFamily="2" charset="2"/>
+              </a:rPr>
+              <a:t>t</a:t>
+            </a:r>
+            <a:r>
+              <a:rPr lang="de-CH" dirty="0" err="1" smtClean="0">
+                <a:sym typeface="Wingdings" panose="05000000000000000000" pitchFamily="2" charset="2"/>
+              </a:rPr>
+              <a:t>hat</a:t>
+            </a:r>
+            <a:r>
+              <a:rPr lang="de-CH" dirty="0" smtClean="0">
+                <a:sym typeface="Wingdings" panose="05000000000000000000" pitchFamily="2" charset="2"/>
+              </a:rPr>
+              <a:t> </a:t>
+            </a:r>
+            <a:r>
+              <a:rPr lang="de-CH" dirty="0" err="1" smtClean="0">
+                <a:sym typeface="Wingdings" panose="05000000000000000000" pitchFamily="2" charset="2"/>
+              </a:rPr>
+              <a:t>pairs</a:t>
+            </a:r>
+            <a:r>
+              <a:rPr lang="de-CH" dirty="0" smtClean="0">
+                <a:sym typeface="Wingdings" panose="05000000000000000000" pitchFamily="2" charset="2"/>
+              </a:rPr>
+              <a:t> </a:t>
+            </a:r>
+            <a:r>
+              <a:rPr lang="de-CH" dirty="0" err="1" smtClean="0">
+                <a:sym typeface="Wingdings" panose="05000000000000000000" pitchFamily="2" charset="2"/>
+              </a:rPr>
+              <a:t>occur</a:t>
+            </a:r>
+            <a:r>
+              <a:rPr lang="de-CH" dirty="0" smtClean="0">
+                <a:sym typeface="Wingdings" panose="05000000000000000000" pitchFamily="2" charset="2"/>
+              </a:rPr>
+              <a:t> </a:t>
+            </a:r>
+            <a:r>
+              <a:rPr lang="de-CH" dirty="0" err="1" smtClean="0">
+                <a:sym typeface="Wingdings" panose="05000000000000000000" pitchFamily="2" charset="2"/>
+              </a:rPr>
+              <a:t>more</a:t>
+            </a:r>
+            <a:r>
+              <a:rPr lang="de-CH" dirty="0" smtClean="0">
+                <a:sym typeface="Wingdings" panose="05000000000000000000" pitchFamily="2" charset="2"/>
+              </a:rPr>
+              <a:t> </a:t>
+            </a:r>
+            <a:r>
+              <a:rPr lang="de-CH" dirty="0" err="1" smtClean="0">
+                <a:sym typeface="Wingdings" panose="05000000000000000000" pitchFamily="2" charset="2"/>
+              </a:rPr>
+              <a:t>than</a:t>
+            </a:r>
+            <a:r>
+              <a:rPr lang="de-CH" dirty="0" smtClean="0">
+                <a:sym typeface="Wingdings" panose="05000000000000000000" pitchFamily="2" charset="2"/>
+              </a:rPr>
+              <a:t> </a:t>
+            </a:r>
+            <a:r>
+              <a:rPr lang="de-CH" dirty="0" err="1" smtClean="0">
+                <a:sym typeface="Wingdings" panose="05000000000000000000" pitchFamily="2" charset="2"/>
+              </a:rPr>
               <a:t>once</a:t>
             </a:r>
-            <a:r>
-              <a:rPr lang="de-CH" dirty="0" smtClean="0"/>
-              <a:t> </a:t>
-            </a:r>
-            <a:r>
-              <a:rPr lang="de-CH" dirty="0" err="1" smtClean="0"/>
-              <a:t>for</a:t>
-            </a:r>
-            <a:r>
-              <a:rPr lang="de-CH" dirty="0" smtClean="0"/>
-              <a:t> R, G, </a:t>
-            </a:r>
-            <a:r>
-              <a:rPr lang="de-CH" dirty="0"/>
-              <a:t>B</a:t>
-            </a:r>
-            <a:r>
-              <a:rPr lang="de-CH" dirty="0" smtClean="0"/>
-              <a:t>)</a:t>
-            </a:r>
-          </a:p>
-          <a:p>
-            <a:r>
-              <a:rPr lang="de-CH" b="1" dirty="0" err="1" smtClean="0"/>
-              <a:t>Better</a:t>
-            </a:r>
-            <a:r>
-              <a:rPr lang="de-CH" b="1" dirty="0" smtClean="0"/>
-              <a:t> </a:t>
-            </a:r>
-            <a:r>
-              <a:rPr lang="de-CH" b="1" dirty="0" err="1" smtClean="0"/>
-              <a:t>solution</a:t>
-            </a:r>
-            <a:r>
-              <a:rPr lang="de-CH" b="1" dirty="0" smtClean="0"/>
-              <a:t>: </a:t>
-            </a:r>
-            <a:r>
-              <a:rPr lang="de-CH" dirty="0" err="1" smtClean="0"/>
-              <a:t>Treat</a:t>
-            </a:r>
-            <a:r>
-              <a:rPr lang="de-CH" dirty="0" smtClean="0"/>
-              <a:t> </a:t>
-            </a:r>
-            <a:r>
-              <a:rPr lang="de-CH" dirty="0" err="1" smtClean="0"/>
-              <a:t>image</a:t>
-            </a:r>
-            <a:r>
-              <a:rPr lang="de-CH" dirty="0" smtClean="0"/>
-              <a:t> </a:t>
-            </a:r>
-            <a:r>
-              <a:rPr lang="de-CH" dirty="0" err="1" smtClean="0"/>
-              <a:t>as</a:t>
-            </a:r>
-            <a:r>
-              <a:rPr lang="de-CH" dirty="0" smtClean="0"/>
-              <a:t> </a:t>
-            </a:r>
-            <a:r>
-              <a:rPr lang="de-CH" dirty="0" err="1" smtClean="0"/>
-              <a:t>single</a:t>
-            </a:r>
-            <a:r>
-              <a:rPr lang="de-CH" dirty="0" smtClean="0"/>
-              <a:t> </a:t>
-            </a:r>
-            <a:r>
-              <a:rPr lang="de-CH" dirty="0" err="1" smtClean="0"/>
-              <a:t>vector</a:t>
-            </a:r>
-            <a:r>
-              <a:rPr lang="de-CH" dirty="0" smtClean="0"/>
-              <a:t>!</a:t>
-            </a:r>
-          </a:p>
-          <a:p>
-            <a:pPr lvl="1"/>
-            <a:r>
-              <a:rPr lang="de-CH" dirty="0" smtClean="0"/>
-              <a:t>Advantage: </a:t>
-            </a:r>
-            <a:r>
-              <a:rPr lang="de-CH" dirty="0" err="1" smtClean="0"/>
-              <a:t>pairs</a:t>
-            </a:r>
-            <a:r>
-              <a:rPr lang="de-CH" dirty="0" smtClean="0"/>
-              <a:t> </a:t>
-            </a:r>
-            <a:r>
-              <a:rPr lang="de-CH" dirty="0" err="1" smtClean="0"/>
-              <a:t>with</a:t>
-            </a:r>
-            <a:r>
-              <a:rPr lang="de-CH" dirty="0" smtClean="0"/>
-              <a:t> same </a:t>
-            </a:r>
-            <a:r>
-              <a:rPr lang="de-CH" dirty="0" err="1" smtClean="0"/>
-              <a:t>value</a:t>
-            </a:r>
-            <a:r>
-              <a:rPr lang="de-CH" dirty="0" smtClean="0"/>
-              <a:t>, </a:t>
-            </a:r>
-            <a:r>
-              <a:rPr lang="de-CH" dirty="0" err="1" smtClean="0"/>
-              <a:t>even</a:t>
-            </a:r>
-            <a:r>
-              <a:rPr lang="de-CH" dirty="0" smtClean="0"/>
-              <a:t> </a:t>
-            </a:r>
-            <a:r>
-              <a:rPr lang="de-CH" dirty="0" err="1" smtClean="0"/>
-              <a:t>from</a:t>
-            </a:r>
-            <a:r>
-              <a:rPr lang="de-CH" dirty="0" smtClean="0"/>
-              <a:t> different </a:t>
-            </a:r>
-            <a:r>
-              <a:rPr lang="de-CH" dirty="0" err="1" smtClean="0"/>
-              <a:t>colors</a:t>
-            </a:r>
-            <a:r>
-              <a:rPr lang="de-CH" dirty="0" smtClean="0"/>
-              <a:t> </a:t>
-            </a:r>
-            <a:r>
-              <a:rPr lang="de-CH" dirty="0" err="1" smtClean="0"/>
-              <a:t>can</a:t>
-            </a:r>
-            <a:r>
-              <a:rPr lang="de-CH" dirty="0" smtClean="0"/>
-              <a:t> </a:t>
-            </a:r>
-            <a:r>
-              <a:rPr lang="de-CH" dirty="0" err="1" smtClean="0"/>
-              <a:t>use</a:t>
-            </a:r>
-            <a:r>
-              <a:rPr lang="de-CH" dirty="0" smtClean="0"/>
-              <a:t> </a:t>
-            </a:r>
-            <a:r>
-              <a:rPr lang="de-CH" dirty="0" err="1" smtClean="0"/>
-              <a:t>the</a:t>
-            </a:r>
-            <a:r>
-              <a:rPr lang="de-CH" dirty="0" smtClean="0"/>
-              <a:t> same </a:t>
-            </a:r>
-            <a:r>
-              <a:rPr lang="de-CH" dirty="0" err="1" smtClean="0"/>
-              <a:t>dictionary</a:t>
-            </a:r>
-            <a:r>
-              <a:rPr lang="de-CH" dirty="0" smtClean="0"/>
-              <a:t> </a:t>
-            </a:r>
-            <a:r>
-              <a:rPr lang="de-CH" dirty="0" err="1" smtClean="0"/>
-              <a:t>entry</a:t>
-            </a:r>
-            <a:r>
-              <a:rPr lang="de-CH" dirty="0" smtClean="0"/>
-              <a:t> </a:t>
-            </a:r>
-          </a:p>
-          <a:p>
-            <a:pPr lvl="1"/>
-            <a:r>
-              <a:rPr lang="de-CH" dirty="0" smtClean="0">
-                <a:sym typeface="Wingdings" panose="05000000000000000000" pitchFamily="2" charset="2"/>
-              </a:rPr>
-              <a:t> </a:t>
-            </a:r>
-            <a:r>
-              <a:rPr lang="de-CH" dirty="0" err="1" smtClean="0">
-                <a:sym typeface="Wingdings" panose="05000000000000000000" pitchFamily="2" charset="2"/>
-              </a:rPr>
-              <a:t>Better</a:t>
-            </a:r>
-            <a:r>
-              <a:rPr lang="de-CH" dirty="0" smtClean="0">
-                <a:sym typeface="Wingdings" panose="05000000000000000000" pitchFamily="2" charset="2"/>
-              </a:rPr>
-              <a:t> </a:t>
-            </a:r>
-            <a:r>
-              <a:rPr lang="de-CH" dirty="0" err="1" smtClean="0">
-                <a:sym typeface="Wingdings" panose="05000000000000000000" pitchFamily="2" charset="2"/>
-              </a:rPr>
-              <a:t>compression</a:t>
-            </a:r>
-            <a:r>
-              <a:rPr lang="de-CH" dirty="0" smtClean="0">
-                <a:sym typeface="Wingdings" panose="05000000000000000000" pitchFamily="2" charset="2"/>
-              </a:rPr>
-              <a:t> (</a:t>
-            </a:r>
-            <a:r>
-              <a:rPr lang="de-CH" dirty="0" err="1" smtClean="0">
-                <a:sym typeface="Wingdings" panose="05000000000000000000" pitchFamily="2" charset="2"/>
-              </a:rPr>
-              <a:t>only</a:t>
-            </a:r>
-            <a:r>
-              <a:rPr lang="de-CH" dirty="0" smtClean="0">
-                <a:sym typeface="Wingdings" panose="05000000000000000000" pitchFamily="2" charset="2"/>
-              </a:rPr>
-              <a:t> 1 </a:t>
-            </a:r>
-            <a:r>
-              <a:rPr lang="de-CH" dirty="0" err="1" smtClean="0">
-                <a:sym typeface="Wingdings" panose="05000000000000000000" pitchFamily="2" charset="2"/>
-              </a:rPr>
-              <a:t>dictionary</a:t>
-            </a:r>
-            <a:r>
-              <a:rPr lang="de-CH" dirty="0" smtClean="0">
-                <a:sym typeface="Wingdings" panose="05000000000000000000" pitchFamily="2" charset="2"/>
-              </a:rPr>
-              <a:t> </a:t>
-            </a:r>
-            <a:r>
-              <a:rPr lang="de-CH" dirty="0" err="1" smtClean="0">
-                <a:sym typeface="Wingdings" panose="05000000000000000000" pitchFamily="2" charset="2"/>
-              </a:rPr>
-              <a:t>instead</a:t>
-            </a:r>
-            <a:r>
-              <a:rPr lang="de-CH" dirty="0" smtClean="0">
-                <a:sym typeface="Wingdings" panose="05000000000000000000" pitchFamily="2" charset="2"/>
-              </a:rPr>
-              <a:t> </a:t>
-            </a:r>
-            <a:r>
-              <a:rPr lang="de-CH" dirty="0" err="1" smtClean="0">
-                <a:sym typeface="Wingdings" panose="05000000000000000000" pitchFamily="2" charset="2"/>
-              </a:rPr>
-              <a:t>of</a:t>
-            </a:r>
-            <a:r>
-              <a:rPr lang="de-CH" dirty="0" smtClean="0">
-                <a:sym typeface="Wingdings" panose="05000000000000000000" pitchFamily="2" charset="2"/>
-              </a:rPr>
-              <a:t> 3)</a:t>
-            </a:r>
-          </a:p>
-          <a:p>
-            <a:pPr lvl="1"/>
-            <a:endParaRPr lang="de-CH" dirty="0">
-              <a:sym typeface="Wingdings" panose="05000000000000000000" pitchFamily="2" charset="2"/>
-            </a:endParaRPr>
-          </a:p>
-          <a:p>
-            <a:pPr lvl="1"/>
             <a:endParaRPr lang="de-CH" dirty="0" smtClean="0">
               <a:sym typeface="Wingdings" panose="05000000000000000000" pitchFamily="2" charset="2"/>
             </a:endParaRPr>
           </a:p>
           <a:p>
-            <a:pPr marL="530352" lvl="1" indent="0">
-              <a:buNone/>
-            </a:pPr>
-            <a:r>
-              <a:rPr lang="de-CH" dirty="0" smtClean="0">
-                <a:solidFill>
-                  <a:srgbClr val="FF0000"/>
-                </a:solidFill>
-                <a:sym typeface="Wingdings" panose="05000000000000000000" pitchFamily="2" charset="2"/>
-              </a:rPr>
-              <a:t>0 0 2 1 2 1 3 3 2 3 3 3</a:t>
-            </a:r>
-            <a:r>
-              <a:rPr lang="de-CH" dirty="0" smtClean="0">
-                <a:sym typeface="Wingdings" panose="05000000000000000000" pitchFamily="2" charset="2"/>
-              </a:rPr>
-              <a:t> </a:t>
-            </a:r>
-            <a:r>
-              <a:rPr lang="de-CH" dirty="0" smtClean="0">
-                <a:solidFill>
-                  <a:srgbClr val="00B050"/>
-                </a:solidFill>
-                <a:sym typeface="Wingdings" panose="05000000000000000000" pitchFamily="2" charset="2"/>
-              </a:rPr>
-              <a:t>2 4 5 7 3 3 2 1 0 0 1 2 3 </a:t>
-            </a:r>
-            <a:r>
-              <a:rPr lang="de-CH" dirty="0" smtClean="0">
-                <a:solidFill>
-                  <a:srgbClr val="0070C0"/>
-                </a:solidFill>
-                <a:sym typeface="Wingdings" panose="05000000000000000000" pitchFamily="2" charset="2"/>
-              </a:rPr>
-              <a:t>3 2 2 2 1 2 3 3 2 2 1 1</a:t>
-            </a:r>
-            <a:endParaRPr lang="de-CH" dirty="0">
-              <a:solidFill>
-                <a:srgbClr val="0070C0"/>
-              </a:solidFill>
-            </a:endParaRPr>
+            <a:pPr lvl="1"/>
+            <a:r>
+              <a:rPr lang="de-CH" dirty="0" smtClean="0">
+                <a:sym typeface="Wingdings" panose="05000000000000000000" pitchFamily="2" charset="2"/>
+              </a:rPr>
+              <a:t>Still a </a:t>
+            </a:r>
+            <a:r>
+              <a:rPr lang="de-CH" dirty="0" err="1" smtClean="0">
+                <a:sym typeface="Wingdings" panose="05000000000000000000" pitchFamily="2" charset="2"/>
+              </a:rPr>
+              <a:t>problem</a:t>
+            </a:r>
+            <a:r>
+              <a:rPr lang="de-CH" dirty="0" smtClean="0">
+                <a:sym typeface="Wingdings" panose="05000000000000000000" pitchFamily="2" charset="2"/>
+              </a:rPr>
+              <a:t>: </a:t>
+            </a:r>
+            <a:r>
+              <a:rPr lang="de-CH" dirty="0" err="1" smtClean="0">
+                <a:sym typeface="Wingdings" panose="05000000000000000000" pitchFamily="2" charset="2"/>
+              </a:rPr>
+              <a:t>Hashtable</a:t>
+            </a:r>
+            <a:r>
+              <a:rPr lang="de-CH" dirty="0" smtClean="0">
+                <a:sym typeface="Wingdings" panose="05000000000000000000" pitchFamily="2" charset="2"/>
+              </a:rPr>
+              <a:t> </a:t>
+            </a:r>
+            <a:r>
+              <a:rPr lang="de-CH" dirty="0" err="1" smtClean="0">
+                <a:sym typeface="Wingdings" panose="05000000000000000000" pitchFamily="2" charset="2"/>
+              </a:rPr>
+              <a:t>is</a:t>
+            </a:r>
+            <a:r>
+              <a:rPr lang="de-CH" dirty="0" smtClean="0">
+                <a:sym typeface="Wingdings" panose="05000000000000000000" pitchFamily="2" charset="2"/>
+              </a:rPr>
+              <a:t> </a:t>
+            </a:r>
+            <a:r>
+              <a:rPr lang="de-CH" dirty="0" err="1" smtClean="0">
+                <a:sym typeface="Wingdings" panose="05000000000000000000" pitchFamily="2" charset="2"/>
+              </a:rPr>
+              <a:t>way</a:t>
+            </a:r>
+            <a:r>
+              <a:rPr lang="de-CH" dirty="0" smtClean="0">
+                <a:sym typeface="Wingdings" panose="05000000000000000000" pitchFamily="2" charset="2"/>
+              </a:rPr>
+              <a:t> </a:t>
+            </a:r>
+            <a:r>
+              <a:rPr lang="de-CH" dirty="0" err="1" smtClean="0">
+                <a:sym typeface="Wingdings" panose="05000000000000000000" pitchFamily="2" charset="2"/>
+              </a:rPr>
+              <a:t>too</a:t>
+            </a:r>
+            <a:r>
+              <a:rPr lang="de-CH" dirty="0" smtClean="0">
+                <a:sym typeface="Wingdings" panose="05000000000000000000" pitchFamily="2" charset="2"/>
+              </a:rPr>
+              <a:t> </a:t>
+            </a:r>
+            <a:r>
+              <a:rPr lang="de-CH" dirty="0" err="1" smtClean="0">
+                <a:sym typeface="Wingdings" panose="05000000000000000000" pitchFamily="2" charset="2"/>
+              </a:rPr>
+              <a:t>big</a:t>
+            </a:r>
+            <a:r>
+              <a:rPr lang="de-CH" dirty="0" smtClean="0">
+                <a:sym typeface="Wingdings" panose="05000000000000000000" pitchFamily="2" charset="2"/>
+              </a:rPr>
+              <a:t>!</a:t>
+            </a:r>
+          </a:p>
+          <a:p>
+            <a:pPr lvl="1"/>
+            <a:r>
+              <a:rPr lang="de-CH" dirty="0" smtClean="0">
+                <a:sym typeface="Wingdings" panose="05000000000000000000" pitchFamily="2" charset="2"/>
+              </a:rPr>
+              <a:t> Solution: </a:t>
+            </a:r>
+            <a:r>
+              <a:rPr lang="de-CH" dirty="0" err="1" smtClean="0">
+                <a:sym typeface="Wingdings" panose="05000000000000000000" pitchFamily="2" charset="2"/>
+              </a:rPr>
+              <a:t>Use</a:t>
+            </a:r>
+            <a:r>
+              <a:rPr lang="de-CH" dirty="0" smtClean="0">
+                <a:sym typeface="Wingdings" panose="05000000000000000000" pitchFamily="2" charset="2"/>
+              </a:rPr>
+              <a:t> </a:t>
+            </a:r>
+            <a:r>
+              <a:rPr lang="de-CH" dirty="0" err="1" smtClean="0">
+                <a:sym typeface="Wingdings" panose="05000000000000000000" pitchFamily="2" charset="2"/>
+              </a:rPr>
+              <a:t>matlab</a:t>
+            </a:r>
+            <a:r>
+              <a:rPr lang="de-CH" dirty="0" smtClean="0">
+                <a:sym typeface="Wingdings" panose="05000000000000000000" pitchFamily="2" charset="2"/>
+              </a:rPr>
+              <a:t> </a:t>
+            </a:r>
+            <a:r>
+              <a:rPr lang="de-CH" dirty="0" err="1" smtClean="0">
+                <a:sym typeface="Wingdings" panose="05000000000000000000" pitchFamily="2" charset="2"/>
+              </a:rPr>
+              <a:t>sparse</a:t>
+            </a:r>
+            <a:r>
+              <a:rPr lang="de-CH" dirty="0" smtClean="0">
+                <a:sym typeface="Wingdings" panose="05000000000000000000" pitchFamily="2" charset="2"/>
+              </a:rPr>
+              <a:t> </a:t>
+            </a:r>
+            <a:r>
+              <a:rPr lang="de-CH" dirty="0" err="1" smtClean="0">
+                <a:sym typeface="Wingdings" panose="05000000000000000000" pitchFamily="2" charset="2"/>
+              </a:rPr>
+              <a:t>matrix</a:t>
+            </a:r>
+            <a:r>
+              <a:rPr lang="de-CH" dirty="0" smtClean="0">
+                <a:sym typeface="Wingdings" panose="05000000000000000000" pitchFamily="2" charset="2"/>
+              </a:rPr>
+              <a:t> </a:t>
+            </a:r>
+            <a:r>
+              <a:rPr lang="de-CH" dirty="0" err="1" smtClean="0">
+                <a:sym typeface="Wingdings" panose="05000000000000000000" pitchFamily="2" charset="2"/>
+              </a:rPr>
+              <a:t>function</a:t>
+            </a:r>
+            <a:r>
+              <a:rPr lang="de-CH" dirty="0" smtClean="0">
+                <a:sym typeface="Wingdings" panose="05000000000000000000" pitchFamily="2" charset="2"/>
+              </a:rPr>
+              <a:t> </a:t>
+            </a:r>
+            <a:r>
+              <a:rPr lang="de-CH" dirty="0">
+                <a:sym typeface="Wingdings" panose="05000000000000000000" pitchFamily="2" charset="2"/>
+              </a:rPr>
+              <a:t>(</a:t>
+            </a:r>
+            <a:r>
+              <a:rPr lang="de-CH" dirty="0" err="1" smtClean="0">
+                <a:sym typeface="Wingdings" panose="05000000000000000000" pitchFamily="2" charset="2"/>
+              </a:rPr>
+              <a:t>only</a:t>
+            </a:r>
+            <a:r>
+              <a:rPr lang="de-CH" dirty="0" smtClean="0">
+                <a:sym typeface="Wingdings" panose="05000000000000000000" pitchFamily="2" charset="2"/>
+              </a:rPr>
+              <a:t> </a:t>
+            </a:r>
+            <a:r>
+              <a:rPr lang="de-CH" dirty="0" err="1" smtClean="0">
+                <a:sym typeface="Wingdings" panose="05000000000000000000" pitchFamily="2" charset="2"/>
+              </a:rPr>
+              <a:t>store</a:t>
+            </a:r>
+            <a:r>
+              <a:rPr lang="de-CH" dirty="0" smtClean="0">
+                <a:sym typeface="Wingdings" panose="05000000000000000000" pitchFamily="2" charset="2"/>
+              </a:rPr>
+              <a:t> non-zeros)</a:t>
+            </a:r>
+          </a:p>
+          <a:p>
+            <a:pPr lvl="1"/>
+            <a:r>
+              <a:rPr lang="de-CH" dirty="0" smtClean="0">
+                <a:sym typeface="Wingdings" panose="05000000000000000000" pitchFamily="2" charset="2"/>
+              </a:rPr>
+              <a:t>a </a:t>
+            </a:r>
+            <a:r>
+              <a:rPr lang="de-CH" dirty="0" err="1" smtClean="0">
+                <a:sym typeface="Wingdings" panose="05000000000000000000" pitchFamily="2" charset="2"/>
+              </a:rPr>
+              <a:t>lot</a:t>
+            </a:r>
+            <a:r>
+              <a:rPr lang="de-CH" dirty="0" smtClean="0">
+                <a:sym typeface="Wingdings" panose="05000000000000000000" pitchFamily="2" charset="2"/>
+              </a:rPr>
+              <a:t> </a:t>
+            </a:r>
+            <a:r>
+              <a:rPr lang="de-CH" dirty="0" err="1" smtClean="0">
+                <a:sym typeface="Wingdings" panose="05000000000000000000" pitchFamily="2" charset="2"/>
+              </a:rPr>
+              <a:t>faster</a:t>
+            </a:r>
+            <a:r>
+              <a:rPr lang="de-CH" dirty="0" smtClean="0">
+                <a:sym typeface="Wingdings" panose="05000000000000000000" pitchFamily="2" charset="2"/>
+              </a:rPr>
+              <a:t>!  </a:t>
+            </a:r>
+            <a:r>
+              <a:rPr lang="de-CH" dirty="0" err="1" smtClean="0">
+                <a:sym typeface="Wingdings" panose="05000000000000000000" pitchFamily="2" charset="2"/>
+              </a:rPr>
+              <a:t>worst</a:t>
+            </a:r>
+            <a:r>
+              <a:rPr lang="de-CH" dirty="0" smtClean="0">
+                <a:sym typeface="Wingdings" panose="05000000000000000000" pitchFamily="2" charset="2"/>
+              </a:rPr>
+              <a:t> </a:t>
+            </a:r>
+            <a:r>
+              <a:rPr lang="de-CH" dirty="0" err="1" smtClean="0">
+                <a:sym typeface="Wingdings" panose="05000000000000000000" pitchFamily="2" charset="2"/>
+              </a:rPr>
+              <a:t>case</a:t>
+            </a:r>
+            <a:r>
+              <a:rPr lang="de-CH" dirty="0" smtClean="0">
+                <a:sym typeface="Wingdings" panose="05000000000000000000" pitchFamily="2" charset="2"/>
+              </a:rPr>
+              <a:t> </a:t>
+            </a:r>
+            <a:r>
+              <a:rPr lang="de-CH" b="1" dirty="0" smtClean="0">
+                <a:sym typeface="Wingdings" panose="05000000000000000000" pitchFamily="2" charset="2"/>
+              </a:rPr>
+              <a:t>O(n^2), </a:t>
+            </a:r>
+            <a:r>
+              <a:rPr lang="de-CH" dirty="0" err="1" smtClean="0">
+                <a:sym typeface="Wingdings" panose="05000000000000000000" pitchFamily="2" charset="2"/>
+              </a:rPr>
+              <a:t>best</a:t>
+            </a:r>
+            <a:r>
+              <a:rPr lang="de-CH" dirty="0" smtClean="0">
+                <a:sym typeface="Wingdings" panose="05000000000000000000" pitchFamily="2" charset="2"/>
+              </a:rPr>
+              <a:t> </a:t>
+            </a:r>
+            <a:r>
+              <a:rPr lang="de-CH" dirty="0" err="1" smtClean="0">
+                <a:sym typeface="Wingdings" panose="05000000000000000000" pitchFamily="2" charset="2"/>
+              </a:rPr>
+              <a:t>case</a:t>
+            </a:r>
+            <a:r>
+              <a:rPr lang="de-CH" dirty="0" smtClean="0">
+                <a:sym typeface="Wingdings" panose="05000000000000000000" pitchFamily="2" charset="2"/>
+              </a:rPr>
+              <a:t> </a:t>
+            </a:r>
+            <a:r>
+              <a:rPr lang="de-CH" b="1" dirty="0" smtClean="0">
+                <a:sym typeface="Wingdings" panose="05000000000000000000" pitchFamily="2" charset="2"/>
+              </a:rPr>
+              <a:t>O(n * log(n))</a:t>
+            </a:r>
+            <a:endParaRPr lang="de-CH" b="1" dirty="0" smtClean="0"/>
+          </a:p>
+          <a:p>
+            <a:pPr lvl="2"/>
+            <a:endParaRPr lang="de-CH" dirty="0"/>
           </a:p>
         </p:txBody>
       </p:sp>
     </p:spTree>
     <p:extLst>
       <p:ext uri="{BB962C8B-B14F-4D97-AF65-F5344CB8AC3E}">
-        <p14:creationId xmlns:p14="http://schemas.microsoft.com/office/powerpoint/2010/main" val="3614770565"/>
+        <p14:creationId xmlns:p14="http://schemas.microsoft.com/office/powerpoint/2010/main" val="1481416882"/>
       </p:ext>
     </p:extLst>
   </p:cSld>
@@ -7380,17 +7565,102 @@
         </p:nvSpPr>
         <p:spPr/>
         <p:txBody>
-          <a:bodyPr/>
+          <a:bodyPr>
+            <a:normAutofit fontScale="90000"/>
+          </a:bodyPr>
           <a:lstStyle/>
           <a:p>
             <a:r>
-              <a:rPr lang="de-CH" dirty="0" err="1" smtClean="0"/>
-              <a:t>Results</a:t>
-            </a:r>
-            <a:r>
-              <a:rPr lang="de-CH" dirty="0" smtClean="0"/>
-              <a:t> (TODO)</a:t>
-            </a:r>
+              <a:rPr lang="de-CH" b="1" dirty="0" smtClean="0"/>
+              <a:t>Problem</a:t>
+            </a:r>
+            <a:r>
+              <a:rPr lang="de-CH" dirty="0" smtClean="0"/>
+              <a:t>: </a:t>
+            </a:r>
+            <a:r>
+              <a:rPr lang="de-CH" sz="4000" dirty="0" err="1"/>
+              <a:t>Described</a:t>
+            </a:r>
+            <a:r>
+              <a:rPr lang="de-CH" sz="4000" dirty="0"/>
+              <a:t> </a:t>
+            </a:r>
+            <a:r>
+              <a:rPr lang="de-CH" sz="4000" dirty="0" err="1"/>
+              <a:t>algorithm</a:t>
+            </a:r>
+            <a:r>
+              <a:rPr lang="de-CH" sz="4000" dirty="0"/>
+              <a:t> </a:t>
+            </a:r>
+            <a:r>
+              <a:rPr lang="de-CH" sz="4000" dirty="0" err="1"/>
+              <a:t>only</a:t>
+            </a:r>
+            <a:r>
+              <a:rPr lang="de-CH" sz="4000" dirty="0"/>
+              <a:t> </a:t>
+            </a:r>
+            <a:r>
+              <a:rPr lang="de-CH" sz="4000" dirty="0" err="1"/>
+              <a:t>works</a:t>
+            </a:r>
+            <a:r>
+              <a:rPr lang="de-CH" sz="4000" dirty="0"/>
+              <a:t> </a:t>
+            </a:r>
+            <a:r>
+              <a:rPr lang="de-CH" sz="4000" dirty="0" err="1"/>
+              <a:t>for</a:t>
+            </a:r>
+            <a:r>
+              <a:rPr lang="de-CH" sz="4000" dirty="0"/>
+              <a:t> </a:t>
+            </a:r>
+            <a:r>
+              <a:rPr lang="de-CH" sz="4000" dirty="0" err="1"/>
+              <a:t>single</a:t>
+            </a:r>
+            <a:r>
+              <a:rPr lang="de-CH" sz="4000" dirty="0"/>
+              <a:t> </a:t>
+            </a:r>
+            <a:r>
+              <a:rPr lang="de-CH" sz="4000" dirty="0" err="1"/>
+              <a:t>value</a:t>
+            </a:r>
+            <a:r>
+              <a:rPr lang="de-CH" sz="4000" dirty="0"/>
+              <a:t> </a:t>
+            </a:r>
+            <a:r>
+              <a:rPr lang="de-CH" sz="4000" dirty="0" err="1"/>
+              <a:t>pixels</a:t>
+            </a:r>
+            <a:r>
+              <a:rPr lang="de-CH" sz="4000" dirty="0"/>
+              <a:t> (</a:t>
+            </a:r>
+            <a:r>
+              <a:rPr lang="de-CH" sz="4000" dirty="0" err="1"/>
+              <a:t>grayscale</a:t>
+            </a:r>
+            <a:r>
+              <a:rPr lang="de-CH" sz="4000" dirty="0"/>
+              <a:t> </a:t>
+            </a:r>
+            <a:r>
+              <a:rPr lang="de-CH" sz="4000" dirty="0" err="1"/>
+              <a:t>images</a:t>
+            </a:r>
+            <a:r>
+              <a:rPr lang="de-CH" sz="4000" dirty="0"/>
+              <a:t>)</a:t>
+            </a:r>
+            <a:br>
+              <a:rPr lang="de-CH" sz="4000" dirty="0"/>
+            </a:br>
             <a:endParaRPr lang="de-CH" dirty="0"/>
           </a:p>
         </p:txBody>
@@ -7407,17 +7677,377 @@
         </p:nvSpPr>
         <p:spPr/>
         <p:txBody>
-          <a:bodyPr/>
+          <a:bodyPr>
+            <a:normAutofit fontScale="92500" lnSpcReduction="10000"/>
+          </a:bodyPr>
           <a:lstStyle/>
           <a:p>
-            <a:endParaRPr lang="de-CH" dirty="0"/>
+            <a:r>
+              <a:rPr lang="de-CH" dirty="0" err="1" smtClean="0"/>
+              <a:t>We</a:t>
+            </a:r>
+            <a:r>
+              <a:rPr lang="de-CH" dirty="0" smtClean="0"/>
+              <a:t> </a:t>
+            </a:r>
+            <a:r>
+              <a:rPr lang="de-CH" dirty="0" err="1" smtClean="0"/>
+              <a:t>want</a:t>
+            </a:r>
+            <a:r>
+              <a:rPr lang="de-CH" dirty="0" smtClean="0"/>
+              <a:t> RGB!</a:t>
+            </a:r>
+          </a:p>
+          <a:p>
+            <a:r>
+              <a:rPr lang="de-CH" b="1" dirty="0" smtClean="0"/>
+              <a:t>Naive </a:t>
+            </a:r>
+            <a:r>
+              <a:rPr lang="de-CH" b="1" dirty="0" err="1" smtClean="0"/>
+              <a:t>solution</a:t>
+            </a:r>
+            <a:r>
+              <a:rPr lang="de-CH" dirty="0" smtClean="0"/>
+              <a:t>: Just </a:t>
+            </a:r>
+            <a:r>
+              <a:rPr lang="de-CH" dirty="0" err="1" smtClean="0"/>
+              <a:t>run</a:t>
+            </a:r>
+            <a:r>
+              <a:rPr lang="de-CH" dirty="0" smtClean="0"/>
+              <a:t> </a:t>
+            </a:r>
+            <a:r>
+              <a:rPr lang="de-CH" dirty="0" err="1" smtClean="0"/>
+              <a:t>algorithm</a:t>
+            </a:r>
+            <a:r>
+              <a:rPr lang="de-CH" dirty="0" smtClean="0"/>
+              <a:t> 3x (</a:t>
+            </a:r>
+            <a:r>
+              <a:rPr lang="de-CH" dirty="0" err="1" smtClean="0"/>
+              <a:t>once</a:t>
+            </a:r>
+            <a:r>
+              <a:rPr lang="de-CH" dirty="0" smtClean="0"/>
+              <a:t> </a:t>
+            </a:r>
+            <a:r>
+              <a:rPr lang="de-CH" dirty="0" err="1" smtClean="0"/>
+              <a:t>for</a:t>
+            </a:r>
+            <a:r>
+              <a:rPr lang="de-CH" dirty="0" smtClean="0"/>
+              <a:t> R, G, </a:t>
+            </a:r>
+            <a:r>
+              <a:rPr lang="de-CH" dirty="0"/>
+              <a:t>B</a:t>
+            </a:r>
+            <a:r>
+              <a:rPr lang="de-CH" dirty="0" smtClean="0"/>
+              <a:t>)</a:t>
+            </a:r>
+          </a:p>
+          <a:p>
+            <a:r>
+              <a:rPr lang="de-CH" b="1" dirty="0" err="1" smtClean="0"/>
+              <a:t>Better</a:t>
+            </a:r>
+            <a:r>
+              <a:rPr lang="de-CH" b="1" dirty="0" smtClean="0"/>
+              <a:t> </a:t>
+            </a:r>
+            <a:r>
+              <a:rPr lang="de-CH" b="1" dirty="0" err="1" smtClean="0"/>
+              <a:t>solution</a:t>
+            </a:r>
+            <a:r>
+              <a:rPr lang="de-CH" b="1" dirty="0" smtClean="0"/>
+              <a:t>: </a:t>
+            </a:r>
+            <a:r>
+              <a:rPr lang="de-CH" dirty="0" err="1" smtClean="0"/>
+              <a:t>Treat</a:t>
+            </a:r>
+            <a:r>
+              <a:rPr lang="de-CH" dirty="0" smtClean="0"/>
+              <a:t> </a:t>
+            </a:r>
+            <a:r>
+              <a:rPr lang="de-CH" dirty="0" err="1" smtClean="0"/>
+              <a:t>image</a:t>
+            </a:r>
+            <a:r>
+              <a:rPr lang="de-CH" dirty="0" smtClean="0"/>
+              <a:t> </a:t>
+            </a:r>
+            <a:r>
+              <a:rPr lang="de-CH" dirty="0" err="1" smtClean="0"/>
+              <a:t>as</a:t>
+            </a:r>
+            <a:r>
+              <a:rPr lang="de-CH" dirty="0" smtClean="0"/>
+              <a:t> </a:t>
+            </a:r>
+            <a:r>
+              <a:rPr lang="de-CH" dirty="0" err="1" smtClean="0"/>
+              <a:t>single</a:t>
+            </a:r>
+            <a:r>
+              <a:rPr lang="de-CH" dirty="0" smtClean="0"/>
+              <a:t> </a:t>
+            </a:r>
+            <a:r>
+              <a:rPr lang="de-CH" dirty="0" err="1" smtClean="0"/>
+              <a:t>vector</a:t>
+            </a:r>
+            <a:r>
+              <a:rPr lang="de-CH" dirty="0" smtClean="0"/>
+              <a:t>!</a:t>
+            </a:r>
+          </a:p>
+          <a:p>
+            <a:pPr lvl="1"/>
+            <a:r>
+              <a:rPr lang="de-CH" dirty="0" smtClean="0"/>
+              <a:t>Advantage: </a:t>
+            </a:r>
+            <a:r>
+              <a:rPr lang="de-CH" dirty="0" err="1" smtClean="0"/>
+              <a:t>pairs</a:t>
+            </a:r>
+            <a:r>
+              <a:rPr lang="de-CH" dirty="0" smtClean="0"/>
+              <a:t> </a:t>
+            </a:r>
+            <a:r>
+              <a:rPr lang="de-CH" dirty="0" err="1" smtClean="0"/>
+              <a:t>with</a:t>
+            </a:r>
+            <a:r>
+              <a:rPr lang="de-CH" dirty="0" smtClean="0"/>
+              <a:t> same </a:t>
+            </a:r>
+            <a:r>
+              <a:rPr lang="de-CH" dirty="0" err="1" smtClean="0"/>
+              <a:t>value</a:t>
+            </a:r>
+            <a:r>
+              <a:rPr lang="de-CH" dirty="0" smtClean="0"/>
+              <a:t>, </a:t>
+            </a:r>
+            <a:r>
+              <a:rPr lang="de-CH" dirty="0" err="1" smtClean="0"/>
+              <a:t>even</a:t>
+            </a:r>
+            <a:r>
+              <a:rPr lang="de-CH" dirty="0" smtClean="0"/>
+              <a:t> </a:t>
+            </a:r>
+            <a:r>
+              <a:rPr lang="de-CH" dirty="0" err="1" smtClean="0"/>
+              <a:t>from</a:t>
+            </a:r>
+            <a:r>
+              <a:rPr lang="de-CH" dirty="0" smtClean="0"/>
+              <a:t> different </a:t>
+            </a:r>
+            <a:r>
+              <a:rPr lang="de-CH" dirty="0" err="1" smtClean="0"/>
+              <a:t>colors</a:t>
+            </a:r>
+            <a:r>
+              <a:rPr lang="de-CH" dirty="0" smtClean="0"/>
+              <a:t> </a:t>
+            </a:r>
+            <a:r>
+              <a:rPr lang="de-CH" dirty="0" err="1" smtClean="0"/>
+              <a:t>can</a:t>
+            </a:r>
+            <a:r>
+              <a:rPr lang="de-CH" dirty="0" smtClean="0"/>
+              <a:t> </a:t>
+            </a:r>
+            <a:r>
+              <a:rPr lang="de-CH" dirty="0" err="1" smtClean="0"/>
+              <a:t>use</a:t>
+            </a:r>
+            <a:r>
+              <a:rPr lang="de-CH" dirty="0" smtClean="0"/>
+              <a:t> </a:t>
+            </a:r>
+            <a:r>
+              <a:rPr lang="de-CH" dirty="0" err="1" smtClean="0"/>
+              <a:t>the</a:t>
+            </a:r>
+            <a:r>
+              <a:rPr lang="de-CH" dirty="0" smtClean="0"/>
+              <a:t> same </a:t>
+            </a:r>
+            <a:r>
+              <a:rPr lang="de-CH" dirty="0" err="1" smtClean="0"/>
+              <a:t>dictionary</a:t>
+            </a:r>
+            <a:r>
+              <a:rPr lang="de-CH" dirty="0" smtClean="0"/>
+              <a:t> </a:t>
+            </a:r>
+            <a:r>
+              <a:rPr lang="de-CH" dirty="0" err="1" smtClean="0"/>
+              <a:t>entry</a:t>
+            </a:r>
+            <a:r>
+              <a:rPr lang="de-CH" dirty="0" smtClean="0"/>
+              <a:t> </a:t>
+            </a:r>
+          </a:p>
+          <a:p>
+            <a:pPr lvl="1"/>
+            <a:r>
+              <a:rPr lang="de-CH" dirty="0" smtClean="0">
+                <a:sym typeface="Wingdings" panose="05000000000000000000" pitchFamily="2" charset="2"/>
+              </a:rPr>
+              <a:t> </a:t>
+            </a:r>
+            <a:r>
+              <a:rPr lang="de-CH" dirty="0" err="1" smtClean="0">
+                <a:sym typeface="Wingdings" panose="05000000000000000000" pitchFamily="2" charset="2"/>
+              </a:rPr>
+              <a:t>Better</a:t>
+            </a:r>
+            <a:r>
+              <a:rPr lang="de-CH" dirty="0" smtClean="0">
+                <a:sym typeface="Wingdings" panose="05000000000000000000" pitchFamily="2" charset="2"/>
+              </a:rPr>
+              <a:t> </a:t>
+            </a:r>
+            <a:r>
+              <a:rPr lang="de-CH" dirty="0" err="1" smtClean="0">
+                <a:sym typeface="Wingdings" panose="05000000000000000000" pitchFamily="2" charset="2"/>
+              </a:rPr>
+              <a:t>compression</a:t>
+            </a:r>
+            <a:r>
+              <a:rPr lang="de-CH" dirty="0" smtClean="0">
+                <a:sym typeface="Wingdings" panose="05000000000000000000" pitchFamily="2" charset="2"/>
+              </a:rPr>
+              <a:t> (</a:t>
+            </a:r>
+            <a:r>
+              <a:rPr lang="de-CH" dirty="0" err="1" smtClean="0">
+                <a:sym typeface="Wingdings" panose="05000000000000000000" pitchFamily="2" charset="2"/>
+              </a:rPr>
+              <a:t>only</a:t>
+            </a:r>
+            <a:r>
+              <a:rPr lang="de-CH" dirty="0" smtClean="0">
+                <a:sym typeface="Wingdings" panose="05000000000000000000" pitchFamily="2" charset="2"/>
+              </a:rPr>
+              <a:t> 1 </a:t>
+            </a:r>
+            <a:r>
+              <a:rPr lang="de-CH" dirty="0" err="1" smtClean="0">
+                <a:sym typeface="Wingdings" panose="05000000000000000000" pitchFamily="2" charset="2"/>
+              </a:rPr>
+              <a:t>dictionary</a:t>
+            </a:r>
+            <a:r>
+              <a:rPr lang="de-CH" dirty="0" smtClean="0">
+                <a:sym typeface="Wingdings" panose="05000000000000000000" pitchFamily="2" charset="2"/>
+              </a:rPr>
+              <a:t> </a:t>
+            </a:r>
+            <a:r>
+              <a:rPr lang="de-CH" dirty="0" err="1" smtClean="0">
+                <a:sym typeface="Wingdings" panose="05000000000000000000" pitchFamily="2" charset="2"/>
+              </a:rPr>
+              <a:t>instead</a:t>
+            </a:r>
+            <a:r>
+              <a:rPr lang="de-CH" dirty="0" smtClean="0">
+                <a:sym typeface="Wingdings" panose="05000000000000000000" pitchFamily="2" charset="2"/>
+              </a:rPr>
+              <a:t> </a:t>
+            </a:r>
+            <a:r>
+              <a:rPr lang="de-CH" dirty="0" err="1" smtClean="0">
+                <a:sym typeface="Wingdings" panose="05000000000000000000" pitchFamily="2" charset="2"/>
+              </a:rPr>
+              <a:t>of</a:t>
+            </a:r>
+            <a:r>
+              <a:rPr lang="de-CH" dirty="0" smtClean="0">
+                <a:sym typeface="Wingdings" panose="05000000000000000000" pitchFamily="2" charset="2"/>
+              </a:rPr>
+              <a:t> 3)</a:t>
+            </a:r>
+          </a:p>
+          <a:p>
+            <a:pPr lvl="1"/>
+            <a:endParaRPr lang="de-CH" dirty="0">
+              <a:sym typeface="Wingdings" panose="05000000000000000000" pitchFamily="2" charset="2"/>
+            </a:endParaRPr>
+          </a:p>
+          <a:p>
+            <a:pPr lvl="1"/>
+            <a:endParaRPr lang="de-CH" dirty="0" smtClean="0">
+              <a:sym typeface="Wingdings" panose="05000000000000000000" pitchFamily="2" charset="2"/>
+            </a:endParaRPr>
+          </a:p>
+          <a:p>
+            <a:pPr marL="530352" lvl="1" indent="0">
+              <a:buNone/>
+            </a:pPr>
+            <a:r>
+              <a:rPr lang="de-CH" dirty="0" smtClean="0">
+                <a:solidFill>
+                  <a:srgbClr val="FF0000"/>
+                </a:solidFill>
+                <a:sym typeface="Wingdings" panose="05000000000000000000" pitchFamily="2" charset="2"/>
+              </a:rPr>
+              <a:t>0 0 2 1 2 1 3 3 2 3 3 3</a:t>
+            </a:r>
+            <a:r>
+              <a:rPr lang="de-CH" dirty="0" smtClean="0">
+                <a:sym typeface="Wingdings" panose="05000000000000000000" pitchFamily="2" charset="2"/>
+              </a:rPr>
+              <a:t> </a:t>
+            </a:r>
+            <a:r>
+              <a:rPr lang="de-CH" dirty="0" smtClean="0">
+                <a:solidFill>
+                  <a:srgbClr val="00B050"/>
+                </a:solidFill>
+                <a:sym typeface="Wingdings" panose="05000000000000000000" pitchFamily="2" charset="2"/>
+              </a:rPr>
+              <a:t>2 4 5 7 3 3 2 1 0 0 1 2 3 </a:t>
+            </a:r>
+            <a:r>
+              <a:rPr lang="de-CH" dirty="0" smtClean="0">
+                <a:solidFill>
+                  <a:srgbClr val="0070C0"/>
+                </a:solidFill>
+                <a:sym typeface="Wingdings" panose="05000000000000000000" pitchFamily="2" charset="2"/>
+              </a:rPr>
+              <a:t>3 2 2 2 1 2 3 3 2 2 1 1</a:t>
+            </a:r>
+            <a:endParaRPr lang="de-CH" dirty="0">
+              <a:solidFill>
+                <a:srgbClr val="0070C0"/>
+              </a:solidFill>
+            </a:endParaRPr>
           </a:p>
         </p:txBody>
       </p:sp>
     </p:spTree>
     <p:extLst>
       <p:ext uri="{BB962C8B-B14F-4D97-AF65-F5344CB8AC3E}">
-        <p14:creationId xmlns:p14="http://schemas.microsoft.com/office/powerpoint/2010/main" val="680714248"/>
+        <p14:creationId xmlns:p14="http://schemas.microsoft.com/office/powerpoint/2010/main" val="3614770565"/>
       </p:ext>
     </p:extLst>
   </p:cSld>
@@ -7467,8 +8097,12 @@
           <a:lstStyle/>
           <a:p>
             <a:r>
-              <a:rPr lang="de-CH" dirty="0" smtClean="0"/>
-              <a:t>Demo</a:t>
+              <a:rPr lang="de-CH" dirty="0" err="1" smtClean="0"/>
+              <a:t>Results</a:t>
+            </a:r>
+            <a:r>
+              <a:rPr lang="de-CH" dirty="0" smtClean="0"/>
+              <a:t> (TODO)</a:t>
             </a:r>
             <a:endParaRPr lang="de-CH" dirty="0"/>
           </a:p>
@@ -7489,14 +8123,14 @@
           <a:bodyPr/>
           <a:lstStyle/>
           <a:p>
-            <a:endParaRPr lang="de-CH"/>
+            <a:endParaRPr lang="de-CH" dirty="0"/>
           </a:p>
         </p:txBody>
       </p:sp>
     </p:spTree>
     <p:extLst>
       <p:ext uri="{BB962C8B-B14F-4D97-AF65-F5344CB8AC3E}">
-        <p14:creationId xmlns:p14="http://schemas.microsoft.com/office/powerpoint/2010/main" val="1860183357"/>
+        <p14:creationId xmlns:p14="http://schemas.microsoft.com/office/powerpoint/2010/main" val="680714248"/>
       </p:ext>
     </p:extLst>
   </p:cSld>

</xml_diff>